<commit_message>
M21 Alphabet Soup Report Update 3.11.24
</commit_message>
<xml_diff>
--- a/Alphabet Soup Analysis.pptx
+++ b/Alphabet Soup Analysis.pptx
@@ -9,9 +9,12 @@
     <p:sldId id="257" r:id="rId3"/>
     <p:sldId id="258" r:id="rId4"/>
     <p:sldId id="259" r:id="rId5"/>
-    <p:sldId id="260" r:id="rId6"/>
-    <p:sldId id="261" r:id="rId7"/>
-    <p:sldId id="262" r:id="rId8"/>
+    <p:sldId id="264" r:id="rId6"/>
+    <p:sldId id="260" r:id="rId7"/>
+    <p:sldId id="265" r:id="rId8"/>
+    <p:sldId id="261" r:id="rId9"/>
+    <p:sldId id="263" r:id="rId10"/>
+    <p:sldId id="262" r:id="rId11"/>
   </p:sldIdLst>
   <p:sldSz cx="12192000" cy="6858000"/>
   <p:notesSz cx="6858000" cy="9144000"/>
@@ -110,13 +113,18 @@
       </a:defRPr>
     </a:lvl9pPr>
   </p:defaultTextStyle>
+  <p:extLst>
+    <p:ext uri="{EFAFB233-063F-42B5-8137-9DF3F51BA10A}">
+      <p15:sldGuideLst xmlns:p15="http://schemas.microsoft.com/office/powerpoint/2012/main"/>
+    </p:ext>
+  </p:extLst>
 </p:presentation>
 </file>
 
 <file path=ppt/revisionInfo.xml><?xml version="1.0" encoding="utf-8"?>
 <p1510:revInfo xmlns:a="http://schemas.openxmlformats.org/drawingml/2006/main" xmlns:r="http://schemas.openxmlformats.org/officeDocument/2006/relationships" xmlns:p1510="http://schemas.microsoft.com/office/powerpoint/2015/10/main">
   <p1510:revLst>
-    <p1510:client id="{246A1C96-AAED-44E7-986B-F1F721A07314}" v="4" dt="2024-03-10T22:45:57.907"/>
+    <p1510:client id="{246A1C96-AAED-44E7-986B-F1F721A07314}" v="16" dt="2024-03-11T13:07:04.411"/>
   </p1510:revLst>
 </p1510:revInfo>
 </file>
@@ -126,7 +134,7 @@
   <pc:docChgLst>
     <pc:chgData name="Rae Ann Gregg" userId="45db863ef249c05a" providerId="LiveId" clId="{246A1C96-AAED-44E7-986B-F1F721A07314}"/>
     <pc:docChg chg="undo custSel addSld modSld sldOrd">
-      <pc:chgData name="Rae Ann Gregg" userId="45db863ef249c05a" providerId="LiveId" clId="{246A1C96-AAED-44E7-986B-F1F721A07314}" dt="2024-03-10T22:48:25.535" v="3976" actId="20577"/>
+      <pc:chgData name="Rae Ann Gregg" userId="45db863ef249c05a" providerId="LiveId" clId="{246A1C96-AAED-44E7-986B-F1F721A07314}" dt="2024-03-11T13:07:29.576" v="5129" actId="1038"/>
       <pc:docMkLst>
         <pc:docMk/>
       </pc:docMkLst>
@@ -154,7 +162,7 @@
         </pc:spChg>
       </pc:sldChg>
       <pc:sldChg chg="addSp delSp modSp new mod modClrScheme chgLayout">
-        <pc:chgData name="Rae Ann Gregg" userId="45db863ef249c05a" providerId="LiveId" clId="{246A1C96-AAED-44E7-986B-F1F721A07314}" dt="2024-03-10T21:22:33.753" v="750" actId="20577"/>
+        <pc:chgData name="Rae Ann Gregg" userId="45db863ef249c05a" providerId="LiveId" clId="{246A1C96-AAED-44E7-986B-F1F721A07314}" dt="2024-03-11T12:05:01.624" v="3988" actId="20577"/>
         <pc:sldMkLst>
           <pc:docMk/>
           <pc:sldMk cId="2326538316" sldId="257"/>
@@ -184,7 +192,7 @@
           </ac:spMkLst>
         </pc:spChg>
         <pc:spChg chg="add mod">
-          <ac:chgData name="Rae Ann Gregg" userId="45db863ef249c05a" providerId="LiveId" clId="{246A1C96-AAED-44E7-986B-F1F721A07314}" dt="2024-03-10T21:22:33.753" v="750" actId="20577"/>
+          <ac:chgData name="Rae Ann Gregg" userId="45db863ef249c05a" providerId="LiveId" clId="{246A1C96-AAED-44E7-986B-F1F721A07314}" dt="2024-03-11T12:05:01.624" v="3988" actId="20577"/>
           <ac:spMkLst>
             <pc:docMk/>
             <pc:sldMk cId="2326538316" sldId="257"/>
@@ -193,7 +201,7 @@
         </pc:spChg>
       </pc:sldChg>
       <pc:sldChg chg="addSp modSp new mod">
-        <pc:chgData name="Rae Ann Gregg" userId="45db863ef249c05a" providerId="LiveId" clId="{246A1C96-AAED-44E7-986B-F1F721A07314}" dt="2024-03-10T21:32:33.540" v="1807" actId="20577"/>
+        <pc:chgData name="Rae Ann Gregg" userId="45db863ef249c05a" providerId="LiveId" clId="{246A1C96-AAED-44E7-986B-F1F721A07314}" dt="2024-03-11T12:12:31.356" v="3996" actId="20577"/>
         <pc:sldMkLst>
           <pc:docMk/>
           <pc:sldMk cId="35897552" sldId="258"/>
@@ -207,7 +215,7 @@
           </ac:spMkLst>
         </pc:spChg>
         <pc:spChg chg="add mod">
-          <ac:chgData name="Rae Ann Gregg" userId="45db863ef249c05a" providerId="LiveId" clId="{246A1C96-AAED-44E7-986B-F1F721A07314}" dt="2024-03-10T21:32:33.540" v="1807" actId="20577"/>
+          <ac:chgData name="Rae Ann Gregg" userId="45db863ef249c05a" providerId="LiveId" clId="{246A1C96-AAED-44E7-986B-F1F721A07314}" dt="2024-03-11T12:12:31.356" v="3996" actId="20577"/>
           <ac:spMkLst>
             <pc:docMk/>
             <pc:sldMk cId="35897552" sldId="258"/>
@@ -215,8 +223,8 @@
           </ac:spMkLst>
         </pc:spChg>
       </pc:sldChg>
-      <pc:sldChg chg="modSp add mod modClrScheme chgLayout">
-        <pc:chgData name="Rae Ann Gregg" userId="45db863ef249c05a" providerId="LiveId" clId="{246A1C96-AAED-44E7-986B-F1F721A07314}" dt="2024-03-10T22:45:57.906" v="3943"/>
+      <pc:sldChg chg="addSp delSp modSp add mod modClrScheme chgLayout">
+        <pc:chgData name="Rae Ann Gregg" userId="45db863ef249c05a" providerId="LiveId" clId="{246A1C96-AAED-44E7-986B-F1F721A07314}" dt="2024-03-11T13:07:29.576" v="5129" actId="1038"/>
         <pc:sldMkLst>
           <pc:docMk/>
           <pc:sldMk cId="3156857603" sldId="259"/>
@@ -230,16 +238,72 @@
           </ac:spMkLst>
         </pc:spChg>
         <pc:spChg chg="mod">
-          <ac:chgData name="Rae Ann Gregg" userId="45db863ef249c05a" providerId="LiveId" clId="{246A1C96-AAED-44E7-986B-F1F721A07314}" dt="2024-03-10T22:45:57.906" v="3943"/>
+          <ac:chgData name="Rae Ann Gregg" userId="45db863ef249c05a" providerId="LiveId" clId="{246A1C96-AAED-44E7-986B-F1F721A07314}" dt="2024-03-11T12:37:05.505" v="4923" actId="20577"/>
           <ac:spMkLst>
             <pc:docMk/>
             <pc:sldMk cId="3156857603" sldId="259"/>
             <ac:spMk id="3" creationId="{073306BE-897D-599C-1207-6F2819D07E18}"/>
           </ac:spMkLst>
         </pc:spChg>
+        <pc:picChg chg="add del mod modCrop">
+          <ac:chgData name="Rae Ann Gregg" userId="45db863ef249c05a" providerId="LiveId" clId="{246A1C96-AAED-44E7-986B-F1F721A07314}" dt="2024-03-11T12:39:57.994" v="4931" actId="478"/>
+          <ac:picMkLst>
+            <pc:docMk/>
+            <pc:sldMk cId="3156857603" sldId="259"/>
+            <ac:picMk id="5" creationId="{586B783B-233E-C9A5-1A6A-C66769928FAF}"/>
+          </ac:picMkLst>
+        </pc:picChg>
+        <pc:picChg chg="add del mod">
+          <ac:chgData name="Rae Ann Gregg" userId="45db863ef249c05a" providerId="LiveId" clId="{246A1C96-AAED-44E7-986B-F1F721A07314}" dt="2024-03-11T13:05:59.575" v="5107" actId="478"/>
+          <ac:picMkLst>
+            <pc:docMk/>
+            <pc:sldMk cId="3156857603" sldId="259"/>
+            <ac:picMk id="6" creationId="{2DD641F7-4371-7C1B-3F9F-7443047B5D79}"/>
+          </ac:picMkLst>
+        </pc:picChg>
+        <pc:picChg chg="add del mod modCrop">
+          <ac:chgData name="Rae Ann Gregg" userId="45db863ef249c05a" providerId="LiveId" clId="{246A1C96-AAED-44E7-986B-F1F721A07314}" dt="2024-03-11T12:41:47.996" v="4942" actId="478"/>
+          <ac:picMkLst>
+            <pc:docMk/>
+            <pc:sldMk cId="3156857603" sldId="259"/>
+            <ac:picMk id="8" creationId="{0FC66DFC-1D5D-7CEB-0E10-131508EEC39E}"/>
+          </ac:picMkLst>
+        </pc:picChg>
+        <pc:picChg chg="add del mod">
+          <ac:chgData name="Rae Ann Gregg" userId="45db863ef249c05a" providerId="LiveId" clId="{246A1C96-AAED-44E7-986B-F1F721A07314}" dt="2024-03-11T13:06:37.777" v="5114" actId="478"/>
+          <ac:picMkLst>
+            <pc:docMk/>
+            <pc:sldMk cId="3156857603" sldId="259"/>
+            <ac:picMk id="9" creationId="{B7BEAE87-229D-3B1C-8774-F843100B0467}"/>
+          </ac:picMkLst>
+        </pc:picChg>
+        <pc:picChg chg="add mod modCrop">
+          <ac:chgData name="Rae Ann Gregg" userId="45db863ef249c05a" providerId="LiveId" clId="{246A1C96-AAED-44E7-986B-F1F721A07314}" dt="2024-03-11T13:07:29.576" v="5129" actId="1038"/>
+          <ac:picMkLst>
+            <pc:docMk/>
+            <pc:sldMk cId="3156857603" sldId="259"/>
+            <ac:picMk id="11" creationId="{F31A198B-D575-3BBD-204E-2DF29C51CB87}"/>
+          </ac:picMkLst>
+        </pc:picChg>
+        <pc:picChg chg="add del mod modCrop">
+          <ac:chgData name="Rae Ann Gregg" userId="45db863ef249c05a" providerId="LiveId" clId="{246A1C96-AAED-44E7-986B-F1F721A07314}" dt="2024-03-11T13:07:06.225" v="5121" actId="478"/>
+          <ac:picMkLst>
+            <pc:docMk/>
+            <pc:sldMk cId="3156857603" sldId="259"/>
+            <ac:picMk id="13" creationId="{E2D308A8-6198-0A78-C70F-A2C47820B579}"/>
+          </ac:picMkLst>
+        </pc:picChg>
+        <pc:picChg chg="add mod">
+          <ac:chgData name="Rae Ann Gregg" userId="45db863ef249c05a" providerId="LiveId" clId="{246A1C96-AAED-44E7-986B-F1F721A07314}" dt="2024-03-11T13:07:24.846" v="5126" actId="1036"/>
+          <ac:picMkLst>
+            <pc:docMk/>
+            <pc:sldMk cId="3156857603" sldId="259"/>
+            <ac:picMk id="14" creationId="{3362631A-53A4-CDAF-EB86-59C0876C42B9}"/>
+          </ac:picMkLst>
+        </pc:picChg>
       </pc:sldChg>
-      <pc:sldChg chg="modSp add mod">
-        <pc:chgData name="Rae Ann Gregg" userId="45db863ef249c05a" providerId="LiveId" clId="{246A1C96-AAED-44E7-986B-F1F721A07314}" dt="2024-03-10T22:45:57.906" v="3943"/>
+      <pc:sldChg chg="addSp delSp modSp add mod">
+        <pc:chgData name="Rae Ann Gregg" userId="45db863ef249c05a" providerId="LiveId" clId="{246A1C96-AAED-44E7-986B-F1F721A07314}" dt="2024-03-11T12:55:33.140" v="5076" actId="14100"/>
         <pc:sldMkLst>
           <pc:docMk/>
           <pc:sldMk cId="532156206" sldId="260"/>
@@ -253,16 +317,48 @@
           </ac:spMkLst>
         </pc:spChg>
         <pc:spChg chg="mod">
-          <ac:chgData name="Rae Ann Gregg" userId="45db863ef249c05a" providerId="LiveId" clId="{246A1C96-AAED-44E7-986B-F1F721A07314}" dt="2024-03-10T22:45:57.906" v="3943"/>
+          <ac:chgData name="Rae Ann Gregg" userId="45db863ef249c05a" providerId="LiveId" clId="{246A1C96-AAED-44E7-986B-F1F721A07314}" dt="2024-03-11T12:36:15.800" v="4865" actId="20577"/>
           <ac:spMkLst>
             <pc:docMk/>
             <pc:sldMk cId="532156206" sldId="260"/>
             <ac:spMk id="3" creationId="{073306BE-897D-599C-1207-6F2819D07E18}"/>
           </ac:spMkLst>
         </pc:spChg>
+        <pc:picChg chg="add mod modCrop">
+          <ac:chgData name="Rae Ann Gregg" userId="45db863ef249c05a" providerId="LiveId" clId="{246A1C96-AAED-44E7-986B-F1F721A07314}" dt="2024-03-11T12:55:27.113" v="5075" actId="1076"/>
+          <ac:picMkLst>
+            <pc:docMk/>
+            <pc:sldMk cId="532156206" sldId="260"/>
+            <ac:picMk id="5" creationId="{FB8DCE14-085A-1920-B14C-D5074E5E1869}"/>
+          </ac:picMkLst>
+        </pc:picChg>
+        <pc:picChg chg="add del">
+          <ac:chgData name="Rae Ann Gregg" userId="45db863ef249c05a" providerId="LiveId" clId="{246A1C96-AAED-44E7-986B-F1F721A07314}" dt="2024-03-11T12:55:00.304" v="5067" actId="478"/>
+          <ac:picMkLst>
+            <pc:docMk/>
+            <pc:sldMk cId="532156206" sldId="260"/>
+            <ac:picMk id="7" creationId="{709CBAC3-562A-F7EA-D85A-D7F3463387D7}"/>
+          </ac:picMkLst>
+        </pc:picChg>
+        <pc:picChg chg="add del mod modCrop">
+          <ac:chgData name="Rae Ann Gregg" userId="45db863ef249c05a" providerId="LiveId" clId="{246A1C96-AAED-44E7-986B-F1F721A07314}" dt="2024-03-11T12:55:10.341" v="5070" actId="478"/>
+          <ac:picMkLst>
+            <pc:docMk/>
+            <pc:sldMk cId="532156206" sldId="260"/>
+            <ac:picMk id="9" creationId="{1CDBF39C-8687-0F25-E122-22D8954621B9}"/>
+          </ac:picMkLst>
+        </pc:picChg>
+        <pc:picChg chg="add mod">
+          <ac:chgData name="Rae Ann Gregg" userId="45db863ef249c05a" providerId="LiveId" clId="{246A1C96-AAED-44E7-986B-F1F721A07314}" dt="2024-03-11T12:55:33.140" v="5076" actId="14100"/>
+          <ac:picMkLst>
+            <pc:docMk/>
+            <pc:sldMk cId="532156206" sldId="260"/>
+            <ac:picMk id="10" creationId="{ACB9BA77-A1B1-2D76-23FF-2EFCE1AC071F}"/>
+          </ac:picMkLst>
+        </pc:picChg>
       </pc:sldChg>
-      <pc:sldChg chg="modSp add mod">
-        <pc:chgData name="Rae Ann Gregg" userId="45db863ef249c05a" providerId="LiveId" clId="{246A1C96-AAED-44E7-986B-F1F721A07314}" dt="2024-03-10T22:45:57.906" v="3943"/>
+      <pc:sldChg chg="addSp delSp modSp add mod">
+        <pc:chgData name="Rae Ann Gregg" userId="45db863ef249c05a" providerId="LiveId" clId="{246A1C96-AAED-44E7-986B-F1F721A07314}" dt="2024-03-11T12:48:58.016" v="5026" actId="14861"/>
         <pc:sldMkLst>
           <pc:docMk/>
           <pc:sldMk cId="2142533285" sldId="261"/>
@@ -276,16 +372,56 @@
           </ac:spMkLst>
         </pc:spChg>
         <pc:spChg chg="mod">
-          <ac:chgData name="Rae Ann Gregg" userId="45db863ef249c05a" providerId="LiveId" clId="{246A1C96-AAED-44E7-986B-F1F721A07314}" dt="2024-03-10T22:45:57.906" v="3943"/>
+          <ac:chgData name="Rae Ann Gregg" userId="45db863ef249c05a" providerId="LiveId" clId="{246A1C96-AAED-44E7-986B-F1F721A07314}" dt="2024-03-11T12:48:35.155" v="5015" actId="20577"/>
           <ac:spMkLst>
             <pc:docMk/>
             <pc:sldMk cId="2142533285" sldId="261"/>
             <ac:spMk id="3" creationId="{073306BE-897D-599C-1207-6F2819D07E18}"/>
           </ac:spMkLst>
         </pc:spChg>
+        <pc:picChg chg="add del mod modCrop">
+          <ac:chgData name="Rae Ann Gregg" userId="45db863ef249c05a" providerId="LiveId" clId="{246A1C96-AAED-44E7-986B-F1F721A07314}" dt="2024-03-11T12:46:37.402" v="4961" actId="478"/>
+          <ac:picMkLst>
+            <pc:docMk/>
+            <pc:sldMk cId="2142533285" sldId="261"/>
+            <ac:picMk id="5" creationId="{B2335A1F-A830-E5E9-76F0-2B6E0FA1463D}"/>
+          </ac:picMkLst>
+        </pc:picChg>
+        <pc:picChg chg="add del mod modCrop">
+          <ac:chgData name="Rae Ann Gregg" userId="45db863ef249c05a" providerId="LiveId" clId="{246A1C96-AAED-44E7-986B-F1F721A07314}" dt="2024-03-11T12:47:16.436" v="4967" actId="478"/>
+          <ac:picMkLst>
+            <pc:docMk/>
+            <pc:sldMk cId="2142533285" sldId="261"/>
+            <ac:picMk id="7" creationId="{5B12F398-721C-598A-807E-B6B477BB79CC}"/>
+          </ac:picMkLst>
+        </pc:picChg>
+        <pc:picChg chg="add mod">
+          <ac:chgData name="Rae Ann Gregg" userId="45db863ef249c05a" providerId="LiveId" clId="{246A1C96-AAED-44E7-986B-F1F721A07314}" dt="2024-03-11T12:48:54.136" v="5025" actId="1036"/>
+          <ac:picMkLst>
+            <pc:docMk/>
+            <pc:sldMk cId="2142533285" sldId="261"/>
+            <ac:picMk id="8" creationId="{71132588-1A63-123B-E1CE-BC2F40B66D73}"/>
+          </ac:picMkLst>
+        </pc:picChg>
+        <pc:picChg chg="add del mod modCrop">
+          <ac:chgData name="Rae Ann Gregg" userId="45db863ef249c05a" providerId="LiveId" clId="{246A1C96-AAED-44E7-986B-F1F721A07314}" dt="2024-03-11T12:48:13.009" v="4978" actId="478"/>
+          <ac:picMkLst>
+            <pc:docMk/>
+            <pc:sldMk cId="2142533285" sldId="261"/>
+            <ac:picMk id="10" creationId="{D4E313ED-B136-2128-BD89-3C1960C76FFE}"/>
+          </ac:picMkLst>
+        </pc:picChg>
+        <pc:picChg chg="add mod">
+          <ac:chgData name="Rae Ann Gregg" userId="45db863ef249c05a" providerId="LiveId" clId="{246A1C96-AAED-44E7-986B-F1F721A07314}" dt="2024-03-11T12:48:58.016" v="5026" actId="14861"/>
+          <ac:picMkLst>
+            <pc:docMk/>
+            <pc:sldMk cId="2142533285" sldId="261"/>
+            <ac:picMk id="11" creationId="{A5FEFB49-BF5A-7EB9-001C-3A55D1FC3CBD}"/>
+          </ac:picMkLst>
+        </pc:picChg>
       </pc:sldChg>
       <pc:sldChg chg="modSp add mod ord">
-        <pc:chgData name="Rae Ann Gregg" userId="45db863ef249c05a" providerId="LiveId" clId="{246A1C96-AAED-44E7-986B-F1F721A07314}" dt="2024-03-10T22:48:25.535" v="3976" actId="20577"/>
+        <pc:chgData name="Rae Ann Gregg" userId="45db863ef249c05a" providerId="LiveId" clId="{246A1C96-AAED-44E7-986B-F1F721A07314}" dt="2024-03-11T12:21:41.798" v="4528" actId="5793"/>
         <pc:sldMkLst>
           <pc:docMk/>
           <pc:sldMk cId="4160537576" sldId="262"/>
@@ -299,13 +435,162 @@
           </ac:spMkLst>
         </pc:spChg>
         <pc:spChg chg="mod">
-          <ac:chgData name="Rae Ann Gregg" userId="45db863ef249c05a" providerId="LiveId" clId="{246A1C96-AAED-44E7-986B-F1F721A07314}" dt="2024-03-10T22:48:25.535" v="3976" actId="20577"/>
+          <ac:chgData name="Rae Ann Gregg" userId="45db863ef249c05a" providerId="LiveId" clId="{246A1C96-AAED-44E7-986B-F1F721A07314}" dt="2024-03-11T12:21:41.798" v="4528" actId="5793"/>
           <ac:spMkLst>
             <pc:docMk/>
             <pc:sldMk cId="4160537576" sldId="262"/>
             <ac:spMk id="3" creationId="{073306BE-897D-599C-1207-6F2819D07E18}"/>
           </ac:spMkLst>
         </pc:spChg>
+      </pc:sldChg>
+      <pc:sldChg chg="addSp delSp modSp add mod">
+        <pc:chgData name="Rae Ann Gregg" userId="45db863ef249c05a" providerId="LiveId" clId="{246A1C96-AAED-44E7-986B-F1F721A07314}" dt="2024-03-11T12:35:08.184" v="4777" actId="1076"/>
+        <pc:sldMkLst>
+          <pc:docMk/>
+          <pc:sldMk cId="4058569024" sldId="263"/>
+        </pc:sldMkLst>
+        <pc:spChg chg="mod">
+          <ac:chgData name="Rae Ann Gregg" userId="45db863ef249c05a" providerId="LiveId" clId="{246A1C96-AAED-44E7-986B-F1F721A07314}" dt="2024-03-11T12:35:04.105" v="4776" actId="20577"/>
+          <ac:spMkLst>
+            <pc:docMk/>
+            <pc:sldMk cId="4058569024" sldId="263"/>
+            <ac:spMk id="3" creationId="{073306BE-897D-599C-1207-6F2819D07E18}"/>
+          </ac:spMkLst>
+        </pc:spChg>
+        <pc:picChg chg="add del mod modCrop">
+          <ac:chgData name="Rae Ann Gregg" userId="45db863ef249c05a" providerId="LiveId" clId="{246A1C96-AAED-44E7-986B-F1F721A07314}" dt="2024-03-11T12:28:05.540" v="4544" actId="478"/>
+          <ac:picMkLst>
+            <pc:docMk/>
+            <pc:sldMk cId="4058569024" sldId="263"/>
+            <ac:picMk id="5" creationId="{0EB83818-2363-E2F5-554C-D5332E3D5BE8}"/>
+          </ac:picMkLst>
+        </pc:picChg>
+        <pc:picChg chg="add mod modCrop">
+          <ac:chgData name="Rae Ann Gregg" userId="45db863ef249c05a" providerId="LiveId" clId="{246A1C96-AAED-44E7-986B-F1F721A07314}" dt="2024-03-11T12:30:57.236" v="4559" actId="14861"/>
+          <ac:picMkLst>
+            <pc:docMk/>
+            <pc:sldMk cId="4058569024" sldId="263"/>
+            <ac:picMk id="6" creationId="{B001F94B-2701-63A1-DB8F-D87AE7A3DA67}"/>
+          </ac:picMkLst>
+        </pc:picChg>
+        <pc:picChg chg="add del mod modCrop">
+          <ac:chgData name="Rae Ann Gregg" userId="45db863ef249c05a" providerId="LiveId" clId="{246A1C96-AAED-44E7-986B-F1F721A07314}" dt="2024-03-11T12:29:11.123" v="4551" actId="478"/>
+          <ac:picMkLst>
+            <pc:docMk/>
+            <pc:sldMk cId="4058569024" sldId="263"/>
+            <ac:picMk id="8" creationId="{B6383E7E-E00E-EA0A-6C73-9433FC40309F}"/>
+          </ac:picMkLst>
+        </pc:picChg>
+        <pc:picChg chg="add mod modCrop">
+          <ac:chgData name="Rae Ann Gregg" userId="45db863ef249c05a" providerId="LiveId" clId="{246A1C96-AAED-44E7-986B-F1F721A07314}" dt="2024-03-11T12:35:08.184" v="4777" actId="1076"/>
+          <ac:picMkLst>
+            <pc:docMk/>
+            <pc:sldMk cId="4058569024" sldId="263"/>
+            <ac:picMk id="9" creationId="{46DB64D8-F5DB-5D63-94AC-90C0400EB43B}"/>
+          </ac:picMkLst>
+        </pc:picChg>
+      </pc:sldChg>
+      <pc:sldChg chg="addSp delSp modSp add mod">
+        <pc:chgData name="Rae Ann Gregg" userId="45db863ef249c05a" providerId="LiveId" clId="{246A1C96-AAED-44E7-986B-F1F721A07314}" dt="2024-03-11T13:05:23.401" v="5106" actId="1076"/>
+        <pc:sldMkLst>
+          <pc:docMk/>
+          <pc:sldMk cId="3468348417" sldId="264"/>
+        </pc:sldMkLst>
+        <pc:spChg chg="mod">
+          <ac:chgData name="Rae Ann Gregg" userId="45db863ef249c05a" providerId="LiveId" clId="{246A1C96-AAED-44E7-986B-F1F721A07314}" dt="2024-03-11T12:36:36.633" v="4907" actId="20577"/>
+          <ac:spMkLst>
+            <pc:docMk/>
+            <pc:sldMk cId="3468348417" sldId="264"/>
+            <ac:spMk id="3" creationId="{073306BE-897D-599C-1207-6F2819D07E18}"/>
+          </ac:spMkLst>
+        </pc:spChg>
+        <pc:picChg chg="add del mod modCrop">
+          <ac:chgData name="Rae Ann Gregg" userId="45db863ef249c05a" providerId="LiveId" clId="{246A1C96-AAED-44E7-986B-F1F721A07314}" dt="2024-03-11T13:03:40.561" v="5077" actId="478"/>
+          <ac:picMkLst>
+            <pc:docMk/>
+            <pc:sldMk cId="3468348417" sldId="264"/>
+            <ac:picMk id="5" creationId="{E25B18DB-18CC-1D91-4B52-2862147A0AA3}"/>
+          </ac:picMkLst>
+        </pc:picChg>
+        <pc:picChg chg="add del mod modCrop">
+          <ac:chgData name="Rae Ann Gregg" userId="45db863ef249c05a" providerId="LiveId" clId="{246A1C96-AAED-44E7-986B-F1F721A07314}" dt="2024-03-11T13:04:23.498" v="5085" actId="478"/>
+          <ac:picMkLst>
+            <pc:docMk/>
+            <pc:sldMk cId="3468348417" sldId="264"/>
+            <ac:picMk id="7" creationId="{1301AB94-DB33-A518-F5BD-385D3931BB9E}"/>
+          </ac:picMkLst>
+        </pc:picChg>
+        <pc:picChg chg="add del mod modCrop">
+          <ac:chgData name="Rae Ann Gregg" userId="45db863ef249c05a" providerId="LiveId" clId="{246A1C96-AAED-44E7-986B-F1F721A07314}" dt="2024-03-11T13:05:19.794" v="5105" actId="478"/>
+          <ac:picMkLst>
+            <pc:docMk/>
+            <pc:sldMk cId="3468348417" sldId="264"/>
+            <ac:picMk id="9" creationId="{865B25DE-626C-41CB-1C0C-C701966B93B4}"/>
+          </ac:picMkLst>
+        </pc:picChg>
+        <pc:picChg chg="add del mod modCrop">
+          <ac:chgData name="Rae Ann Gregg" userId="45db863ef249c05a" providerId="LiveId" clId="{246A1C96-AAED-44E7-986B-F1F721A07314}" dt="2024-03-11T13:04:48.484" v="5091" actId="478"/>
+          <ac:picMkLst>
+            <pc:docMk/>
+            <pc:sldMk cId="3468348417" sldId="264"/>
+            <ac:picMk id="11" creationId="{64C645AF-9D66-6057-5EDF-234F026840DD}"/>
+          </ac:picMkLst>
+        </pc:picChg>
+        <pc:picChg chg="add mod">
+          <ac:chgData name="Rae Ann Gregg" userId="45db863ef249c05a" providerId="LiveId" clId="{246A1C96-AAED-44E7-986B-F1F721A07314}" dt="2024-03-11T13:05:11.662" v="5103" actId="1036"/>
+          <ac:picMkLst>
+            <pc:docMk/>
+            <pc:sldMk cId="3468348417" sldId="264"/>
+            <ac:picMk id="12" creationId="{29ECF3E1-1B1C-6791-D502-A85869A1BD77}"/>
+          </ac:picMkLst>
+        </pc:picChg>
+        <pc:picChg chg="add mod">
+          <ac:chgData name="Rae Ann Gregg" userId="45db863ef249c05a" providerId="LiveId" clId="{246A1C96-AAED-44E7-986B-F1F721A07314}" dt="2024-03-11T13:05:23.401" v="5106" actId="1076"/>
+          <ac:picMkLst>
+            <pc:docMk/>
+            <pc:sldMk cId="3468348417" sldId="264"/>
+            <ac:picMk id="13" creationId="{C7EAC101-951F-D96C-B55E-FE90873900DB}"/>
+          </ac:picMkLst>
+        </pc:picChg>
+      </pc:sldChg>
+      <pc:sldChg chg="addSp delSp modSp add mod">
+        <pc:chgData name="Rae Ann Gregg" userId="45db863ef249c05a" providerId="LiveId" clId="{246A1C96-AAED-44E7-986B-F1F721A07314}" dt="2024-03-11T12:52:05.028" v="5047" actId="1076"/>
+        <pc:sldMkLst>
+          <pc:docMk/>
+          <pc:sldMk cId="1338354364" sldId="265"/>
+        </pc:sldMkLst>
+        <pc:spChg chg="mod">
+          <ac:chgData name="Rae Ann Gregg" userId="45db863ef249c05a" providerId="LiveId" clId="{246A1C96-AAED-44E7-986B-F1F721A07314}" dt="2024-03-11T12:37:44.696" v="4924" actId="20577"/>
+          <ac:spMkLst>
+            <pc:docMk/>
+            <pc:sldMk cId="1338354364" sldId="265"/>
+            <ac:spMk id="3" creationId="{073306BE-897D-599C-1207-6F2819D07E18}"/>
+          </ac:spMkLst>
+        </pc:spChg>
+        <pc:picChg chg="add mod modCrop">
+          <ac:chgData name="Rae Ann Gregg" userId="45db863ef249c05a" providerId="LiveId" clId="{246A1C96-AAED-44E7-986B-F1F721A07314}" dt="2024-03-11T12:52:05.028" v="5047" actId="1076"/>
+          <ac:picMkLst>
+            <pc:docMk/>
+            <pc:sldMk cId="1338354364" sldId="265"/>
+            <ac:picMk id="5" creationId="{0FC753BB-D743-B80C-3FE1-0AFBCF061041}"/>
+          </ac:picMkLst>
+        </pc:picChg>
+        <pc:picChg chg="add del mod modCrop">
+          <ac:chgData name="Rae Ann Gregg" userId="45db863ef249c05a" providerId="LiveId" clId="{246A1C96-AAED-44E7-986B-F1F721A07314}" dt="2024-03-11T12:51:40.140" v="5042" actId="478"/>
+          <ac:picMkLst>
+            <pc:docMk/>
+            <pc:sldMk cId="1338354364" sldId="265"/>
+            <ac:picMk id="7" creationId="{58B513AD-4A3F-E466-8A3D-85E51BFF078B}"/>
+          </ac:picMkLst>
+        </pc:picChg>
+        <pc:picChg chg="add mod">
+          <ac:chgData name="Rae Ann Gregg" userId="45db863ef249c05a" providerId="LiveId" clId="{246A1C96-AAED-44E7-986B-F1F721A07314}" dt="2024-03-11T12:51:59.259" v="5046" actId="14861"/>
+          <ac:picMkLst>
+            <pc:docMk/>
+            <pc:sldMk cId="1338354364" sldId="265"/>
+            <ac:picMk id="8" creationId="{711EA611-52C3-3456-0D51-10A9B8881890}"/>
+          </ac:picMkLst>
+        </pc:picChg>
       </pc:sldChg>
     </pc:docChg>
   </pc:docChgLst>
@@ -538,7 +823,7 @@
           <a:p>
             <a:fld id="{7FE3F64E-3DCA-4515-BA80-90343005C592}" type="datetimeFigureOut">
               <a:rPr lang="en-US" smtClean="0"/>
-              <a:t>3/10/2024</a:t>
+              <a:t>3/11/2024</a:t>
             </a:fld>
             <a:endParaRPr lang="en-US"/>
           </a:p>
@@ -746,7 +1031,7 @@
           <a:p>
             <a:fld id="{7FE3F64E-3DCA-4515-BA80-90343005C592}" type="datetimeFigureOut">
               <a:rPr lang="en-US" smtClean="0"/>
-              <a:t>3/10/2024</a:t>
+              <a:t>3/11/2024</a:t>
             </a:fld>
             <a:endParaRPr lang="en-US"/>
           </a:p>
@@ -1002,7 +1287,7 @@
           <a:p>
             <a:fld id="{7FE3F64E-3DCA-4515-BA80-90343005C592}" type="datetimeFigureOut">
               <a:rPr lang="en-US" smtClean="0"/>
-              <a:t>3/10/2024</a:t>
+              <a:t>3/11/2024</a:t>
             </a:fld>
             <a:endParaRPr lang="en-US"/>
           </a:p>
@@ -1176,7 +1461,7 @@
           <a:p>
             <a:fld id="{7FE3F64E-3DCA-4515-BA80-90343005C592}" type="datetimeFigureOut">
               <a:rPr lang="en-US" smtClean="0"/>
-              <a:t>3/10/2024</a:t>
+              <a:t>3/11/2024</a:t>
             </a:fld>
             <a:endParaRPr lang="en-US"/>
           </a:p>
@@ -1519,7 +1804,7 @@
           <a:p>
             <a:fld id="{7FE3F64E-3DCA-4515-BA80-90343005C592}" type="datetimeFigureOut">
               <a:rPr lang="en-US" smtClean="0"/>
-              <a:t>3/10/2024</a:t>
+              <a:t>3/11/2024</a:t>
             </a:fld>
             <a:endParaRPr lang="en-US"/>
           </a:p>
@@ -1794,7 +2079,7 @@
           <a:p>
             <a:fld id="{7FE3F64E-3DCA-4515-BA80-90343005C592}" type="datetimeFigureOut">
               <a:rPr lang="en-US" smtClean="0"/>
-              <a:t>3/10/2024</a:t>
+              <a:t>3/11/2024</a:t>
             </a:fld>
             <a:endParaRPr lang="en-US"/>
           </a:p>
@@ -2173,7 +2458,7 @@
           <a:p>
             <a:fld id="{7FE3F64E-3DCA-4515-BA80-90343005C592}" type="datetimeFigureOut">
               <a:rPr lang="en-US" smtClean="0"/>
-              <a:t>3/10/2024</a:t>
+              <a:t>3/11/2024</a:t>
             </a:fld>
             <a:endParaRPr lang="en-US"/>
           </a:p>
@@ -2291,7 +2576,7 @@
           <a:p>
             <a:fld id="{7FE3F64E-3DCA-4515-BA80-90343005C592}" type="datetimeFigureOut">
               <a:rPr lang="en-US" smtClean="0"/>
-              <a:t>3/10/2024</a:t>
+              <a:t>3/11/2024</a:t>
             </a:fld>
             <a:endParaRPr lang="en-US"/>
           </a:p>
@@ -2462,7 +2747,7 @@
           <a:p>
             <a:fld id="{7FE3F64E-3DCA-4515-BA80-90343005C592}" type="datetimeFigureOut">
               <a:rPr lang="en-US" smtClean="0"/>
-              <a:t>3/10/2024</a:t>
+              <a:t>3/11/2024</a:t>
             </a:fld>
             <a:endParaRPr lang="en-US"/>
           </a:p>
@@ -2816,7 +3101,7 @@
           <a:p>
             <a:fld id="{7FE3F64E-3DCA-4515-BA80-90343005C592}" type="datetimeFigureOut">
               <a:rPr lang="en-US" smtClean="0"/>
-              <a:t>3/10/2024</a:t>
+              <a:t>3/11/2024</a:t>
             </a:fld>
             <a:endParaRPr lang="en-US"/>
           </a:p>
@@ -3198,7 +3483,7 @@
           <a:p>
             <a:fld id="{7FE3F64E-3DCA-4515-BA80-90343005C592}" type="datetimeFigureOut">
               <a:rPr lang="en-US" smtClean="0"/>
-              <a:t>3/10/2024</a:t>
+              <a:t>3/11/2024</a:t>
             </a:fld>
             <a:endParaRPr lang="en-US"/>
           </a:p>
@@ -3485,7 +3770,7 @@
           <a:p>
             <a:fld id="{7FE3F64E-3DCA-4515-BA80-90343005C592}" type="datetimeFigureOut">
               <a:rPr lang="en-US" smtClean="0"/>
-              <a:t>3/10/2024</a:t>
+              <a:t>3/11/2024</a:t>
             </a:fld>
             <a:endParaRPr lang="en-US"/>
           </a:p>
@@ -4092,6 +4377,172 @@
 </p:sld>
 </file>
 
+<file path=ppt/slides/slide10.xml><?xml version="1.0" encoding="utf-8"?>
+<p:sld xmlns:a="http://schemas.openxmlformats.org/drawingml/2006/main" xmlns:r="http://schemas.openxmlformats.org/officeDocument/2006/relationships" xmlns:p="http://schemas.openxmlformats.org/presentationml/2006/main">
+  <p:cSld>
+    <p:spTree>
+      <p:nvGrpSpPr>
+        <p:cNvPr id="1" name=""/>
+        <p:cNvGrpSpPr/>
+        <p:nvPr/>
+      </p:nvGrpSpPr>
+      <p:grpSpPr>
+        <a:xfrm>
+          <a:off x="0" y="0"/>
+          <a:ext cx="0" cy="0"/>
+          <a:chOff x="0" y="0"/>
+          <a:chExt cx="0" cy="0"/>
+        </a:xfrm>
+      </p:grpSpPr>
+      <p:sp>
+        <p:nvSpPr>
+          <p:cNvPr id="2" name="Title 1">
+            <a:extLst>
+              <a:ext uri="{FF2B5EF4-FFF2-40B4-BE49-F238E27FC236}">
+                <a16:creationId xmlns:a16="http://schemas.microsoft.com/office/drawing/2014/main" id="{239116D8-A839-3D25-F7BF-A9B1C7A46B65}"/>
+              </a:ext>
+            </a:extLst>
+          </p:cNvPr>
+          <p:cNvSpPr>
+            <a:spLocks noGrp="1"/>
+          </p:cNvSpPr>
+          <p:nvPr>
+            <p:ph type="title"/>
+          </p:nvPr>
+        </p:nvSpPr>
+        <p:spPr/>
+        <p:txBody>
+          <a:bodyPr/>
+          <a:lstStyle/>
+          <a:p>
+            <a:r>
+              <a:rPr lang="en-US" dirty="0"/>
+              <a:t>Alphabet Soup Analysis Results Summary</a:t>
+            </a:r>
+          </a:p>
+        </p:txBody>
+      </p:sp>
+      <p:sp>
+        <p:nvSpPr>
+          <p:cNvPr id="3" name="TextBox 2">
+            <a:extLst>
+              <a:ext uri="{FF2B5EF4-FFF2-40B4-BE49-F238E27FC236}">
+                <a16:creationId xmlns:a16="http://schemas.microsoft.com/office/drawing/2014/main" id="{073306BE-897D-599C-1207-6F2819D07E18}"/>
+              </a:ext>
+            </a:extLst>
+          </p:cNvPr>
+          <p:cNvSpPr txBox="1"/>
+          <p:nvPr/>
+        </p:nvSpPr>
+        <p:spPr>
+          <a:xfrm>
+            <a:off x="1097280" y="1897811"/>
+            <a:ext cx="10134312" cy="2585323"/>
+          </a:xfrm>
+          <a:prstGeom prst="rect">
+            <a:avLst/>
+          </a:prstGeom>
+          <a:noFill/>
+        </p:spPr>
+        <p:txBody>
+          <a:bodyPr wrap="square" rtlCol="0">
+            <a:spAutoFit/>
+          </a:bodyPr>
+          <a:lstStyle/>
+          <a:p>
+            <a:pPr algn="l"/>
+            <a:r>
+              <a:rPr lang="en-US" dirty="0">
+                <a:solidFill>
+                  <a:srgbClr val="2B2B2B"/>
+                </a:solidFill>
+                <a:latin typeface="Roboto" panose="02000000000000000000" pitchFamily="2" charset="0"/>
+              </a:rPr>
+              <a:t>Overall, by using machine learning, we can predict with almost 79% accuracy which campaigns will be successful.  This will help us fund campaigns more efficiently. </a:t>
+            </a:r>
+          </a:p>
+          <a:p>
+            <a:pPr algn="l"/>
+            <a:r>
+              <a:rPr lang="en-US" dirty="0">
+                <a:solidFill>
+                  <a:srgbClr val="2B2B2B"/>
+                </a:solidFill>
+                <a:latin typeface="Roboto" panose="02000000000000000000" pitchFamily="2" charset="0"/>
+              </a:rPr>
+              <a:t>It would be ideal to continue to try other models to improve the accuracy even more.   </a:t>
+            </a:r>
+          </a:p>
+          <a:p>
+            <a:pPr algn="l"/>
+            <a:r>
+              <a:rPr lang="en-US" i="0" dirty="0">
+                <a:solidFill>
+                  <a:srgbClr val="2B2B2B"/>
+                </a:solidFill>
+                <a:effectLst/>
+                <a:latin typeface="Roboto" panose="02000000000000000000" pitchFamily="2" charset="0"/>
+              </a:rPr>
+              <a:t>The greatest gains in accuracy were gained from adding layers and neurons and including the NAME data.  Continuing to adjust the layers, neurons and binning could further increase the prediction accuracy.</a:t>
+            </a:r>
+          </a:p>
+          <a:p>
+            <a:pPr algn="l"/>
+            <a:r>
+              <a:rPr lang="en-US" i="0" dirty="0">
+                <a:solidFill>
+                  <a:srgbClr val="2B2B2B"/>
+                </a:solidFill>
+                <a:effectLst/>
+                <a:latin typeface="Roboto" panose="02000000000000000000" pitchFamily="2" charset="0"/>
+              </a:rPr>
+              <a:t>The Tanh model could also be used to try to increase the accuracy since it will normalize the data.</a:t>
+            </a:r>
+          </a:p>
+          <a:p>
+            <a:pPr algn="l"/>
+            <a:r>
+              <a:rPr lang="en-US" i="0" dirty="0">
+                <a:solidFill>
+                  <a:srgbClr val="2B2B2B"/>
+                </a:solidFill>
+                <a:effectLst/>
+                <a:latin typeface="Roboto" panose="02000000000000000000" pitchFamily="2" charset="0"/>
+              </a:rPr>
+              <a:t>The R</a:t>
+            </a:r>
+            <a:r>
+              <a:rPr lang="en-US" dirty="0">
+                <a:solidFill>
+                  <a:srgbClr val="2B2B2B"/>
+                </a:solidFill>
+                <a:latin typeface="Roboto" panose="02000000000000000000" pitchFamily="2" charset="0"/>
+              </a:rPr>
+              <a:t>andom Forest Model can also be used to create a decision tree to find the predictive variables. Explain why…</a:t>
+            </a:r>
+            <a:endParaRPr lang="en-US" i="0" dirty="0">
+              <a:solidFill>
+                <a:srgbClr val="2B2B2B"/>
+              </a:solidFill>
+              <a:effectLst/>
+              <a:latin typeface="Roboto" panose="02000000000000000000" pitchFamily="2" charset="0"/>
+            </a:endParaRPr>
+          </a:p>
+        </p:txBody>
+      </p:sp>
+    </p:spTree>
+    <p:extLst>
+      <p:ext uri="{BB962C8B-B14F-4D97-AF65-F5344CB8AC3E}">
+        <p14:creationId xmlns:p14="http://schemas.microsoft.com/office/powerpoint/2010/main" val="4160537576"/>
+      </p:ext>
+    </p:extLst>
+  </p:cSld>
+  <p:clrMapOvr>
+    <a:masterClrMapping/>
+  </p:clrMapOvr>
+</p:sld>
+</file>
+
 <file path=ppt/slides/slide2.xml><?xml version="1.0" encoding="utf-8"?>
 <p:sld xmlns:a="http://schemas.openxmlformats.org/drawingml/2006/main" xmlns:r="http://schemas.openxmlformats.org/officeDocument/2006/relationships" xmlns:p="http://schemas.openxmlformats.org/presentationml/2006/main">
   <p:cSld>
@@ -4173,7 +4624,7 @@
                 </a:solidFill>
                 <a:latin typeface="Roboto" panose="02000000000000000000" pitchFamily="2" charset="0"/>
               </a:rPr>
-              <a:t>The purpose of this project is to create a tool for  </a:t>
+              <a:t>The purpose of this project is to create a tool for </a:t>
             </a:r>
             <a:r>
               <a:rPr lang="en-US" sz="1600" b="0" i="0" dirty="0">
@@ -4801,7 +5252,7 @@
                 <a:effectLst/>
                 <a:latin typeface="Roboto" panose="02000000000000000000" pitchFamily="2" charset="0"/>
               </a:rPr>
-              <a:t>The data was split into training and testing data and scaled for a more balanced distribution.</a:t>
+              <a:t>The data was split 80/20 into training and testing data and scaled for a more balanced distribution.</a:t>
             </a:r>
           </a:p>
         </p:txBody>
@@ -4883,8 +5334,8 @@
         </p:nvSpPr>
         <p:spPr>
           <a:xfrm>
-            <a:off x="1099133" y="819517"/>
-            <a:ext cx="10058400" cy="4308872"/>
+            <a:off x="508008" y="819517"/>
+            <a:ext cx="10058400" cy="2339102"/>
           </a:xfrm>
           <a:prstGeom prst="rect">
             <a:avLst/>
@@ -5099,257 +5550,84 @@
                 </a:solidFill>
                 <a:latin typeface="Roboto" panose="02000000000000000000" pitchFamily="2" charset="0"/>
               </a:rPr>
-              <a:t>Accuracy – 51.43%</a:t>
-            </a:r>
-          </a:p>
-          <a:p>
-            <a:pPr marL="1200150" lvl="2" indent="-285750">
-              <a:buFont typeface="Arial" panose="020B0604020202020204" pitchFamily="34" charset="0"/>
-              <a:buChar char="•"/>
-            </a:pPr>
-            <a:r>
-              <a:rPr lang="en-US" sz="1600" b="1" i="0" dirty="0">
-                <a:solidFill>
-                  <a:srgbClr val="2B2B2B"/>
-                </a:solidFill>
-                <a:effectLst/>
-                <a:latin typeface="Roboto" panose="02000000000000000000" pitchFamily="2" charset="0"/>
-              </a:rPr>
-              <a:t>Optimization 1 </a:t>
-            </a:r>
-            <a:r>
-              <a:rPr lang="en-US" sz="1600" b="0" i="0" dirty="0">
-                <a:solidFill>
-                  <a:srgbClr val="2B2B2B"/>
-                </a:solidFill>
-                <a:effectLst/>
-                <a:latin typeface="Roboto" panose="02000000000000000000" pitchFamily="2" charset="0"/>
-              </a:rPr>
-              <a:t>– added a hidden layer and increased the nodes</a:t>
-            </a:r>
-          </a:p>
-          <a:p>
-            <a:pPr marL="1657350" lvl="3" indent="-285750">
-              <a:buFont typeface="Arial" panose="020B0604020202020204" pitchFamily="34" charset="0"/>
-              <a:buChar char="•"/>
-            </a:pPr>
-            <a:r>
-              <a:rPr lang="en-US" sz="1600" dirty="0">
-                <a:solidFill>
-                  <a:srgbClr val="2B2B2B"/>
-                </a:solidFill>
-                <a:latin typeface="Roboto" panose="02000000000000000000" pitchFamily="2" charset="0"/>
-              </a:rPr>
-              <a:t>Dropped EIN and Name Columns</a:t>
-            </a:r>
-          </a:p>
-          <a:p>
-            <a:pPr marL="1657350" lvl="3" indent="-285750">
-              <a:buFont typeface="Arial" panose="020B0604020202020204" pitchFamily="34" charset="0"/>
-              <a:buChar char="•"/>
-            </a:pPr>
-            <a:r>
-              <a:rPr lang="en-US" sz="1600" dirty="0">
-                <a:solidFill>
-                  <a:srgbClr val="2B2B2B"/>
-                </a:solidFill>
-                <a:latin typeface="Roboto" panose="02000000000000000000" pitchFamily="2" charset="0"/>
-              </a:rPr>
-              <a:t>1</a:t>
-            </a:r>
-            <a:r>
-              <a:rPr lang="en-US" sz="1600" baseline="30000" dirty="0">
-                <a:solidFill>
-                  <a:srgbClr val="2B2B2B"/>
-                </a:solidFill>
-                <a:latin typeface="Roboto" panose="02000000000000000000" pitchFamily="2" charset="0"/>
-              </a:rPr>
-              <a:t>st</a:t>
-            </a:r>
-            <a:r>
-              <a:rPr lang="en-US" sz="1600" dirty="0">
-                <a:solidFill>
-                  <a:srgbClr val="2B2B2B"/>
-                </a:solidFill>
-                <a:latin typeface="Roboto" panose="02000000000000000000" pitchFamily="2" charset="0"/>
-              </a:rPr>
-              <a:t> layer – 80 neurons with </a:t>
-            </a:r>
-            <a:r>
-              <a:rPr lang="en-US" sz="1600" dirty="0" err="1">
-                <a:solidFill>
-                  <a:srgbClr val="2B2B2B"/>
-                </a:solidFill>
-                <a:latin typeface="Roboto" panose="02000000000000000000" pitchFamily="2" charset="0"/>
-              </a:rPr>
-              <a:t>ReLU</a:t>
-            </a:r>
-            <a:r>
-              <a:rPr lang="en-US" sz="1600" dirty="0">
-                <a:solidFill>
-                  <a:srgbClr val="2B2B2B"/>
-                </a:solidFill>
-                <a:latin typeface="Roboto" panose="02000000000000000000" pitchFamily="2" charset="0"/>
-              </a:rPr>
-              <a:t> activation</a:t>
-            </a:r>
-          </a:p>
-          <a:p>
-            <a:pPr marL="1657350" lvl="3" indent="-285750">
-              <a:buFont typeface="Arial" panose="020B0604020202020204" pitchFamily="34" charset="0"/>
-              <a:buChar char="•"/>
-            </a:pPr>
-            <a:r>
-              <a:rPr lang="en-US" sz="1600" dirty="0">
-                <a:solidFill>
-                  <a:srgbClr val="2B2B2B"/>
-                </a:solidFill>
-                <a:latin typeface="Roboto" panose="02000000000000000000" pitchFamily="2" charset="0"/>
-              </a:rPr>
-              <a:t>2</a:t>
-            </a:r>
-            <a:r>
-              <a:rPr lang="en-US" sz="1600" baseline="30000" dirty="0">
-                <a:solidFill>
-                  <a:srgbClr val="2B2B2B"/>
-                </a:solidFill>
-                <a:latin typeface="Roboto" panose="02000000000000000000" pitchFamily="2" charset="0"/>
-              </a:rPr>
-              <a:t>nd</a:t>
-            </a:r>
-            <a:r>
-              <a:rPr lang="en-US" sz="1600" dirty="0">
-                <a:solidFill>
-                  <a:srgbClr val="2B2B2B"/>
-                </a:solidFill>
-                <a:latin typeface="Roboto" panose="02000000000000000000" pitchFamily="2" charset="0"/>
-              </a:rPr>
-              <a:t> layer – 40 neurons with </a:t>
-            </a:r>
-            <a:r>
-              <a:rPr lang="en-US" sz="1600" dirty="0" err="1">
-                <a:solidFill>
-                  <a:srgbClr val="2B2B2B"/>
-                </a:solidFill>
-                <a:latin typeface="Roboto" panose="02000000000000000000" pitchFamily="2" charset="0"/>
-              </a:rPr>
-              <a:t>ReLU</a:t>
-            </a:r>
-            <a:r>
-              <a:rPr lang="en-US" sz="1600" dirty="0">
-                <a:solidFill>
-                  <a:srgbClr val="2B2B2B"/>
-                </a:solidFill>
-                <a:latin typeface="Roboto" panose="02000000000000000000" pitchFamily="2" charset="0"/>
-              </a:rPr>
-              <a:t> activation</a:t>
-            </a:r>
-          </a:p>
-          <a:p>
-            <a:pPr marL="1657350" lvl="3" indent="-285750">
-              <a:buFont typeface="Arial" panose="020B0604020202020204" pitchFamily="34" charset="0"/>
-              <a:buChar char="•"/>
-            </a:pPr>
-            <a:r>
-              <a:rPr lang="en-US" sz="1600" dirty="0">
-                <a:solidFill>
-                  <a:srgbClr val="2B2B2B"/>
-                </a:solidFill>
-                <a:latin typeface="Roboto" panose="02000000000000000000" pitchFamily="2" charset="0"/>
-              </a:rPr>
-              <a:t>3</a:t>
-            </a:r>
-            <a:r>
-              <a:rPr lang="en-US" sz="1600" baseline="30000" dirty="0">
-                <a:solidFill>
-                  <a:srgbClr val="2B2B2B"/>
-                </a:solidFill>
-                <a:latin typeface="Roboto" panose="02000000000000000000" pitchFamily="2" charset="0"/>
-              </a:rPr>
-              <a:t>rd</a:t>
-            </a:r>
-            <a:r>
-              <a:rPr lang="en-US" sz="1600" dirty="0">
-                <a:solidFill>
-                  <a:srgbClr val="2B2B2B"/>
-                </a:solidFill>
-                <a:latin typeface="Roboto" panose="02000000000000000000" pitchFamily="2" charset="0"/>
-              </a:rPr>
-              <a:t> layer – 20 neurons with </a:t>
-            </a:r>
-            <a:r>
-              <a:rPr lang="en-US" sz="1600" dirty="0" err="1">
-                <a:solidFill>
-                  <a:srgbClr val="2B2B2B"/>
-                </a:solidFill>
-                <a:latin typeface="Roboto" panose="02000000000000000000" pitchFamily="2" charset="0"/>
-              </a:rPr>
-              <a:t>ReLU</a:t>
-            </a:r>
-            <a:r>
-              <a:rPr lang="en-US" sz="1600" dirty="0">
-                <a:solidFill>
-                  <a:srgbClr val="2B2B2B"/>
-                </a:solidFill>
-                <a:latin typeface="Roboto" panose="02000000000000000000" pitchFamily="2" charset="0"/>
-              </a:rPr>
-              <a:t> activation</a:t>
-            </a:r>
-          </a:p>
-          <a:p>
-            <a:pPr marL="1657350" lvl="3" indent="-285750">
-              <a:buFont typeface="Arial" panose="020B0604020202020204" pitchFamily="34" charset="0"/>
-              <a:buChar char="•"/>
-            </a:pPr>
-            <a:r>
-              <a:rPr lang="en-US" sz="1600" dirty="0">
-                <a:solidFill>
-                  <a:srgbClr val="2B2B2B"/>
-                </a:solidFill>
-                <a:latin typeface="Roboto" panose="02000000000000000000" pitchFamily="2" charset="0"/>
-              </a:rPr>
-              <a:t>Output layer – 1 neuron with Sigmoid activation</a:t>
-            </a:r>
-          </a:p>
-          <a:p>
-            <a:pPr marL="1657350" lvl="3" indent="-285750">
-              <a:buFont typeface="Arial" panose="020B0604020202020204" pitchFamily="34" charset="0"/>
-              <a:buChar char="•"/>
-            </a:pPr>
-            <a:r>
-              <a:rPr lang="en-US" sz="1600" dirty="0">
-                <a:solidFill>
-                  <a:srgbClr val="2B2B2B"/>
-                </a:solidFill>
-                <a:latin typeface="Roboto" panose="02000000000000000000" pitchFamily="2" charset="0"/>
-              </a:rPr>
-              <a:t>100 epochs</a:t>
-            </a:r>
-          </a:p>
-          <a:p>
-            <a:pPr marL="1657350" lvl="3" indent="-285750">
-              <a:buFont typeface="Arial" panose="020B0604020202020204" pitchFamily="34" charset="0"/>
-              <a:buChar char="•"/>
-            </a:pPr>
-            <a:r>
-              <a:rPr lang="en-US" sz="1600" dirty="0">
-                <a:solidFill>
-                  <a:srgbClr val="2B2B2B"/>
-                </a:solidFill>
-                <a:latin typeface="Roboto" panose="02000000000000000000" pitchFamily="2" charset="0"/>
-              </a:rPr>
-              <a:t>Accuracy – 72.92%</a:t>
-            </a:r>
-            <a:endParaRPr lang="en-US" sz="1600" b="0" i="0" dirty="0">
-              <a:solidFill>
-                <a:srgbClr val="2B2B2B"/>
-              </a:solidFill>
-              <a:effectLst/>
-              <a:latin typeface="Roboto" panose="02000000000000000000" pitchFamily="2" charset="0"/>
-            </a:endParaRPr>
+              <a:t>51.43% Accuracy</a:t>
+            </a:r>
           </a:p>
         </p:txBody>
       </p:sp>
+      <p:pic>
+        <p:nvPicPr>
+          <p:cNvPr id="11" name="Picture 10">
+            <a:extLst>
+              <a:ext uri="{FF2B5EF4-FFF2-40B4-BE49-F238E27FC236}">
+                <a16:creationId xmlns:a16="http://schemas.microsoft.com/office/drawing/2014/main" id="{F31A198B-D575-3BBD-204E-2DF29C51CB87}"/>
+              </a:ext>
+            </a:extLst>
+          </p:cNvPr>
+          <p:cNvPicPr>
+            <a:picLocks noChangeAspect="1"/>
+          </p:cNvPicPr>
+          <p:nvPr/>
+        </p:nvPicPr>
+        <p:blipFill rotWithShape="1">
+          <a:blip r:embed="rId2"/>
+          <a:srcRect l="3030" t="53067" r="55985" b="12543"/>
+          <a:stretch/>
+        </p:blipFill>
+        <p:spPr>
+          <a:xfrm>
+            <a:off x="1108369" y="3918124"/>
+            <a:ext cx="4996872" cy="2253674"/>
+          </a:xfrm>
+          <a:prstGeom prst="rect">
+            <a:avLst/>
+          </a:prstGeom>
+          <a:effectLst>
+            <a:outerShdw blurRad="63500" sx="102000" sy="102000" algn="ctr" rotWithShape="0">
+              <a:prstClr val="black">
+                <a:alpha val="40000"/>
+              </a:prstClr>
+            </a:outerShdw>
+          </a:effectLst>
+        </p:spPr>
+      </p:pic>
+      <p:pic>
+        <p:nvPicPr>
+          <p:cNvPr id="14" name="Picture 13">
+            <a:extLst>
+              <a:ext uri="{FF2B5EF4-FFF2-40B4-BE49-F238E27FC236}">
+                <a16:creationId xmlns:a16="http://schemas.microsoft.com/office/drawing/2014/main" id="{3362631A-53A4-CDAF-EB86-59C0876C42B9}"/>
+              </a:ext>
+            </a:extLst>
+          </p:cNvPr>
+          <p:cNvPicPr>
+            <a:picLocks noChangeAspect="1"/>
+          </p:cNvPicPr>
+          <p:nvPr/>
+        </p:nvPicPr>
+        <p:blipFill>
+          <a:blip r:embed="rId3"/>
+          <a:stretch>
+            <a:fillRect/>
+          </a:stretch>
+        </p:blipFill>
+        <p:spPr>
+          <a:xfrm>
+            <a:off x="6533913" y="2096654"/>
+            <a:ext cx="5359254" cy="4075144"/>
+          </a:xfrm>
+          <a:prstGeom prst="rect">
+            <a:avLst/>
+          </a:prstGeom>
+          <a:effectLst>
+            <a:outerShdw blurRad="63500" sx="102000" sy="102000" algn="ctr" rotWithShape="0">
+              <a:prstClr val="black">
+                <a:alpha val="40000"/>
+              </a:prstClr>
+            </a:outerShdw>
+          </a:effectLst>
+        </p:spPr>
+      </p:pic>
     </p:spTree>
     <p:extLst>
       <p:ext uri="{BB962C8B-B14F-4D97-AF65-F5344CB8AC3E}">
@@ -5398,7 +5676,7 @@
         </p:nvSpPr>
         <p:spPr>
           <a:xfrm>
-            <a:off x="1099133" y="78482"/>
+            <a:off x="1099133" y="78483"/>
             <a:ext cx="10058400" cy="830262"/>
           </a:xfrm>
         </p:spPr>
@@ -5427,8 +5705,8 @@
         </p:nvSpPr>
         <p:spPr>
           <a:xfrm>
-            <a:off x="1099133" y="810891"/>
-            <a:ext cx="10058400" cy="5047536"/>
+            <a:off x="517250" y="819517"/>
+            <a:ext cx="10058400" cy="2585323"/>
           </a:xfrm>
           <a:prstGeom prst="rect">
             <a:avLst/>
@@ -5475,22 +5753,24 @@
               <a:buChar char="•"/>
             </a:pPr>
             <a:r>
-              <a:rPr lang="en-US" sz="1600" b="1" dirty="0">
-                <a:solidFill>
-                  <a:srgbClr val="2B2B2B"/>
-                </a:solidFill>
-                <a:latin typeface="Roboto" panose="02000000000000000000" pitchFamily="2" charset="0"/>
-              </a:rPr>
-              <a:t>Optimization 2 </a:t>
-            </a:r>
-            <a:r>
-              <a:rPr lang="en-US" sz="1600" dirty="0">
-                <a:solidFill>
-                  <a:srgbClr val="2B2B2B"/>
-                </a:solidFill>
-                <a:latin typeface="Roboto" panose="02000000000000000000" pitchFamily="2" charset="0"/>
-              </a:rPr>
-              <a:t>– increased the nodes and the epochs</a:t>
+              <a:rPr lang="en-US" sz="1600" b="1" i="0" dirty="0">
+                <a:solidFill>
+                  <a:srgbClr val="2B2B2B"/>
+                </a:solidFill>
+                <a:effectLst/>
+                <a:latin typeface="Roboto" panose="02000000000000000000" pitchFamily="2" charset="0"/>
+              </a:rPr>
+              <a:t>Optimization 1 </a:t>
+            </a:r>
+            <a:r>
+              <a:rPr lang="en-US" sz="1600" b="0" i="0" dirty="0">
+                <a:solidFill>
+                  <a:srgbClr val="2B2B2B"/>
+                </a:solidFill>
+                <a:effectLst/>
+                <a:latin typeface="Roboto" panose="02000000000000000000" pitchFamily="2" charset="0"/>
+              </a:rPr>
+              <a:t>– added a hidden layer and increased the nodes</a:t>
             </a:r>
           </a:p>
           <a:p>
@@ -5538,7 +5818,7 @@
                 </a:solidFill>
                 <a:latin typeface="Roboto" panose="02000000000000000000" pitchFamily="2" charset="0"/>
               </a:rPr>
-              <a:t> layer – 100 neurons with </a:t>
+              <a:t> layer – 80 neurons with </a:t>
             </a:r>
             <a:r>
               <a:rPr lang="en-US" sz="1600" dirty="0" err="1">
@@ -5589,7 +5869,7 @@
                 </a:solidFill>
                 <a:latin typeface="Roboto" panose="02000000000000000000" pitchFamily="2" charset="0"/>
               </a:rPr>
-              <a:t> layer – 50 neurons with </a:t>
+              <a:t> layer – 40 neurons with </a:t>
             </a:r>
             <a:r>
               <a:rPr lang="en-US" sz="1600" dirty="0" err="1">
@@ -5640,7 +5920,7 @@
                 </a:solidFill>
                 <a:latin typeface="Roboto" panose="02000000000000000000" pitchFamily="2" charset="0"/>
               </a:rPr>
-              <a:t> layer – 25 neurons with </a:t>
+              <a:t> layer – 20 neurons with </a:t>
             </a:r>
             <a:r>
               <a:rPr lang="en-US" sz="1600" dirty="0" err="1">
@@ -5688,7 +5968,7 @@
                 </a:solidFill>
                 <a:latin typeface="Roboto" panose="02000000000000000000" pitchFamily="2" charset="0"/>
               </a:rPr>
-              <a:t>150 epochs</a:t>
+              <a:t>100 epochs</a:t>
             </a:r>
           </a:p>
           <a:p>
@@ -5703,292 +5983,89 @@
                 </a:solidFill>
                 <a:latin typeface="Roboto" panose="02000000000000000000" pitchFamily="2" charset="0"/>
               </a:rPr>
-              <a:t>Accuracy – 72.96%</a:t>
-            </a:r>
-          </a:p>
-          <a:p>
-            <a:pPr marL="1200150" lvl="2" indent="-285750">
-              <a:buFont typeface="Arial" panose="020B0604020202020204" pitchFamily="34" charset="0"/>
-              <a:buChar char="•"/>
-            </a:pPr>
-            <a:r>
-              <a:rPr lang="en-US" sz="1600" b="1" i="0" dirty="0">
-                <a:solidFill>
-                  <a:srgbClr val="2B2B2B"/>
-                </a:solidFill>
-                <a:effectLst/>
-                <a:latin typeface="Roboto" panose="02000000000000000000" pitchFamily="2" charset="0"/>
-              </a:rPr>
-              <a:t>Optimization </a:t>
-            </a:r>
-            <a:r>
-              <a:rPr lang="en-US" sz="1600" b="1" dirty="0">
-                <a:solidFill>
-                  <a:srgbClr val="2B2B2B"/>
-                </a:solidFill>
-                <a:latin typeface="Roboto" panose="02000000000000000000" pitchFamily="2" charset="0"/>
-              </a:rPr>
-              <a:t>3 </a:t>
-            </a:r>
-            <a:r>
-              <a:rPr lang="en-US" sz="1600" dirty="0">
-                <a:solidFill>
-                  <a:srgbClr val="2B2B2B"/>
-                </a:solidFill>
-                <a:latin typeface="Roboto" panose="02000000000000000000" pitchFamily="2" charset="0"/>
-              </a:rPr>
-              <a:t>– adjusted to fewer bins and reduced the epochs back to 100</a:t>
-            </a:r>
-          </a:p>
-          <a:p>
-            <a:pPr marL="1657350" lvl="3" indent="-285750">
-              <a:buFont typeface="Arial" panose="020B0604020202020204" pitchFamily="34" charset="0"/>
-              <a:buChar char="•"/>
-            </a:pPr>
-            <a:r>
-              <a:rPr lang="en-US" sz="1600" dirty="0">
-                <a:solidFill>
-                  <a:srgbClr val="2B2B2B"/>
-                </a:solidFill>
-                <a:latin typeface="Roboto" panose="02000000000000000000" pitchFamily="2" charset="0"/>
-              </a:rPr>
-              <a:t>Dropped EIN and Name Columns</a:t>
-            </a:r>
-          </a:p>
-          <a:p>
-            <a:pPr marL="1657350" lvl="3" indent="-285750">
-              <a:buFont typeface="Arial" panose="020B0604020202020204" pitchFamily="34" charset="0"/>
-              <a:buChar char="•"/>
-            </a:pPr>
-            <a:r>
-              <a:rPr lang="en-US" sz="1600" dirty="0">
-                <a:solidFill>
-                  <a:srgbClr val="2B2B2B"/>
-                </a:solidFill>
-                <a:latin typeface="Roboto" panose="02000000000000000000" pitchFamily="2" charset="0"/>
-              </a:rPr>
-              <a:t>Changed app count cut off from 500 to 50</a:t>
-            </a:r>
-          </a:p>
-          <a:p>
-            <a:pPr marL="1657350" lvl="3" indent="-285750">
-              <a:buFont typeface="Arial" panose="020B0604020202020204" pitchFamily="34" charset="0"/>
-              <a:buChar char="•"/>
-            </a:pPr>
-            <a:r>
-              <a:rPr lang="en-US" sz="1600" dirty="0">
-                <a:solidFill>
-                  <a:srgbClr val="2B2B2B"/>
-                </a:solidFill>
-                <a:latin typeface="Roboto" panose="02000000000000000000" pitchFamily="2" charset="0"/>
-              </a:rPr>
-              <a:t>Changed class count cut off from 1000 to 100</a:t>
-            </a:r>
-          </a:p>
-          <a:p>
-            <a:pPr marL="1657350" lvl="3" indent="-285750">
-              <a:buFont typeface="Arial" panose="020B0604020202020204" pitchFamily="34" charset="0"/>
-              <a:buChar char="•"/>
-            </a:pPr>
-            <a:r>
-              <a:rPr lang="en-US" sz="1600" dirty="0">
-                <a:solidFill>
-                  <a:srgbClr val="2B2B2B"/>
-                </a:solidFill>
-                <a:latin typeface="Roboto" panose="02000000000000000000" pitchFamily="2" charset="0"/>
-              </a:rPr>
-              <a:t>1</a:t>
-            </a:r>
-            <a:r>
-              <a:rPr lang="en-US" sz="1600" baseline="30000" dirty="0">
-                <a:solidFill>
-                  <a:srgbClr val="2B2B2B"/>
-                </a:solidFill>
-                <a:latin typeface="Roboto" panose="02000000000000000000" pitchFamily="2" charset="0"/>
-              </a:rPr>
-              <a:t>st</a:t>
-            </a:r>
-            <a:r>
-              <a:rPr lang="en-US" sz="1600" dirty="0">
-                <a:solidFill>
-                  <a:srgbClr val="2B2B2B"/>
-                </a:solidFill>
-                <a:latin typeface="Roboto" panose="02000000000000000000" pitchFamily="2" charset="0"/>
-              </a:rPr>
-              <a:t> layer – 100 neurons with </a:t>
-            </a:r>
-            <a:r>
-              <a:rPr lang="en-US" sz="1600" dirty="0" err="1">
-                <a:solidFill>
-                  <a:srgbClr val="2B2B2B"/>
-                </a:solidFill>
-                <a:latin typeface="Roboto" panose="02000000000000000000" pitchFamily="2" charset="0"/>
-              </a:rPr>
-              <a:t>ReLU</a:t>
-            </a:r>
-            <a:r>
-              <a:rPr lang="en-US" sz="1600" dirty="0">
-                <a:solidFill>
-                  <a:srgbClr val="2B2B2B"/>
-                </a:solidFill>
-                <a:latin typeface="Roboto" panose="02000000000000000000" pitchFamily="2" charset="0"/>
-              </a:rPr>
-              <a:t> activation</a:t>
-            </a:r>
-          </a:p>
-          <a:p>
-            <a:pPr marL="1657350" lvl="3" indent="-285750">
-              <a:buFont typeface="Arial" panose="020B0604020202020204" pitchFamily="34" charset="0"/>
-              <a:buChar char="•"/>
-            </a:pPr>
-            <a:r>
-              <a:rPr lang="en-US" sz="1600" dirty="0">
-                <a:solidFill>
-                  <a:srgbClr val="2B2B2B"/>
-                </a:solidFill>
-                <a:latin typeface="Roboto" panose="02000000000000000000" pitchFamily="2" charset="0"/>
-              </a:rPr>
-              <a:t>2</a:t>
-            </a:r>
-            <a:r>
-              <a:rPr lang="en-US" sz="1600" baseline="30000" dirty="0">
-                <a:solidFill>
-                  <a:srgbClr val="2B2B2B"/>
-                </a:solidFill>
-                <a:latin typeface="Roboto" panose="02000000000000000000" pitchFamily="2" charset="0"/>
-              </a:rPr>
-              <a:t>nd</a:t>
-            </a:r>
-            <a:r>
-              <a:rPr lang="en-US" sz="1600" dirty="0">
-                <a:solidFill>
-                  <a:srgbClr val="2B2B2B"/>
-                </a:solidFill>
-                <a:latin typeface="Roboto" panose="02000000000000000000" pitchFamily="2" charset="0"/>
-              </a:rPr>
-              <a:t> layer – 50 neurons with </a:t>
-            </a:r>
-            <a:r>
-              <a:rPr lang="en-US" sz="1600" dirty="0" err="1">
-                <a:solidFill>
-                  <a:srgbClr val="2B2B2B"/>
-                </a:solidFill>
-                <a:latin typeface="Roboto" panose="02000000000000000000" pitchFamily="2" charset="0"/>
-              </a:rPr>
-              <a:t>ReLU</a:t>
-            </a:r>
-            <a:r>
-              <a:rPr lang="en-US" sz="1600" dirty="0">
-                <a:solidFill>
-                  <a:srgbClr val="2B2B2B"/>
-                </a:solidFill>
-                <a:latin typeface="Roboto" panose="02000000000000000000" pitchFamily="2" charset="0"/>
-              </a:rPr>
-              <a:t> activation</a:t>
-            </a:r>
-          </a:p>
-          <a:p>
-            <a:pPr marL="1657350" lvl="3" indent="-285750">
-              <a:buFont typeface="Arial" panose="020B0604020202020204" pitchFamily="34" charset="0"/>
-              <a:buChar char="•"/>
-            </a:pPr>
-            <a:r>
-              <a:rPr lang="en-US" sz="1600" dirty="0">
-                <a:solidFill>
-                  <a:srgbClr val="2B2B2B"/>
-                </a:solidFill>
-                <a:latin typeface="Roboto" panose="02000000000000000000" pitchFamily="2" charset="0"/>
-              </a:rPr>
-              <a:t>3</a:t>
-            </a:r>
-            <a:r>
-              <a:rPr lang="en-US" sz="1600" baseline="30000" dirty="0">
-                <a:solidFill>
-                  <a:srgbClr val="2B2B2B"/>
-                </a:solidFill>
-                <a:latin typeface="Roboto" panose="02000000000000000000" pitchFamily="2" charset="0"/>
-              </a:rPr>
-              <a:t>rd</a:t>
-            </a:r>
-            <a:r>
-              <a:rPr lang="en-US" sz="1600" dirty="0">
-                <a:solidFill>
-                  <a:srgbClr val="2B2B2B"/>
-                </a:solidFill>
-                <a:latin typeface="Roboto" panose="02000000000000000000" pitchFamily="2" charset="0"/>
-              </a:rPr>
-              <a:t> layer – 25 neurons with </a:t>
-            </a:r>
-            <a:r>
-              <a:rPr lang="en-US" sz="1600" dirty="0" err="1">
-                <a:solidFill>
-                  <a:srgbClr val="2B2B2B"/>
-                </a:solidFill>
-                <a:latin typeface="Roboto" panose="02000000000000000000" pitchFamily="2" charset="0"/>
-              </a:rPr>
-              <a:t>ReLU</a:t>
-            </a:r>
-            <a:r>
-              <a:rPr lang="en-US" sz="1600" dirty="0">
-                <a:solidFill>
-                  <a:srgbClr val="2B2B2B"/>
-                </a:solidFill>
-                <a:latin typeface="Roboto" panose="02000000000000000000" pitchFamily="2" charset="0"/>
-              </a:rPr>
-              <a:t> activation</a:t>
-            </a:r>
-          </a:p>
-          <a:p>
-            <a:pPr marL="1657350" lvl="3" indent="-285750">
-              <a:buFont typeface="Arial" panose="020B0604020202020204" pitchFamily="34" charset="0"/>
-              <a:buChar char="•"/>
-            </a:pPr>
-            <a:r>
-              <a:rPr lang="en-US" sz="1600" dirty="0">
-                <a:solidFill>
-                  <a:srgbClr val="2B2B2B"/>
-                </a:solidFill>
-                <a:latin typeface="Roboto" panose="02000000000000000000" pitchFamily="2" charset="0"/>
-              </a:rPr>
-              <a:t>Output layer – 1 neuron with Sigmoid activation</a:t>
-            </a:r>
-          </a:p>
-          <a:p>
-            <a:pPr marL="1657350" lvl="3" indent="-285750">
-              <a:buFont typeface="Arial" panose="020B0604020202020204" pitchFamily="34" charset="0"/>
-              <a:buChar char="•"/>
-            </a:pPr>
-            <a:r>
-              <a:rPr lang="en-US" sz="1600" dirty="0">
-                <a:solidFill>
-                  <a:srgbClr val="2B2B2B"/>
-                </a:solidFill>
-                <a:latin typeface="Roboto" panose="02000000000000000000" pitchFamily="2" charset="0"/>
-              </a:rPr>
-              <a:t>100 epochs</a:t>
-            </a:r>
-          </a:p>
-          <a:p>
-            <a:pPr marL="1657350" lvl="3" indent="-285750">
-              <a:buFont typeface="Arial" panose="020B0604020202020204" pitchFamily="34" charset="0"/>
-              <a:buChar char="•"/>
-            </a:pPr>
-            <a:r>
-              <a:rPr lang="en-US" sz="1600" dirty="0">
-                <a:solidFill>
-                  <a:srgbClr val="2B2B2B"/>
-                </a:solidFill>
-                <a:latin typeface="Roboto" panose="02000000000000000000" pitchFamily="2" charset="0"/>
-              </a:rPr>
-              <a:t>Accuracy – 72.91% - slightly less than Optimization 2</a:t>
-            </a:r>
+              <a:t>72.92% Accuracy – increased by over 20%</a:t>
+            </a:r>
+            <a:endParaRPr lang="en-US" sz="1600" b="0" i="0" dirty="0">
+              <a:solidFill>
+                <a:srgbClr val="2B2B2B"/>
+              </a:solidFill>
+              <a:effectLst/>
+              <a:latin typeface="Roboto" panose="02000000000000000000" pitchFamily="2" charset="0"/>
+            </a:endParaRPr>
           </a:p>
         </p:txBody>
       </p:sp>
+      <p:pic>
+        <p:nvPicPr>
+          <p:cNvPr id="12" name="Picture 11">
+            <a:extLst>
+              <a:ext uri="{FF2B5EF4-FFF2-40B4-BE49-F238E27FC236}">
+                <a16:creationId xmlns:a16="http://schemas.microsoft.com/office/drawing/2014/main" id="{29ECF3E1-1B1C-6791-D502-A85869A1BD77}"/>
+              </a:ext>
+            </a:extLst>
+          </p:cNvPr>
+          <p:cNvPicPr>
+            <a:picLocks noChangeAspect="1"/>
+          </p:cNvPicPr>
+          <p:nvPr/>
+        </p:nvPicPr>
+        <p:blipFill>
+          <a:blip r:embed="rId2"/>
+          <a:stretch>
+            <a:fillRect/>
+          </a:stretch>
+        </p:blipFill>
+        <p:spPr>
+          <a:xfrm>
+            <a:off x="6882667" y="1714431"/>
+            <a:ext cx="5167701" cy="4467671"/>
+          </a:xfrm>
+          <a:prstGeom prst="rect">
+            <a:avLst/>
+          </a:prstGeom>
+          <a:effectLst>
+            <a:outerShdw blurRad="63500" sx="102000" sy="102000" algn="ctr" rotWithShape="0">
+              <a:prstClr val="black">
+                <a:alpha val="40000"/>
+              </a:prstClr>
+            </a:outerShdw>
+          </a:effectLst>
+        </p:spPr>
+      </p:pic>
+      <p:pic>
+        <p:nvPicPr>
+          <p:cNvPr id="13" name="Picture 12">
+            <a:extLst>
+              <a:ext uri="{FF2B5EF4-FFF2-40B4-BE49-F238E27FC236}">
+                <a16:creationId xmlns:a16="http://schemas.microsoft.com/office/drawing/2014/main" id="{C7EAC101-951F-D96C-B55E-FE90873900DB}"/>
+              </a:ext>
+            </a:extLst>
+          </p:cNvPr>
+          <p:cNvPicPr>
+            <a:picLocks noChangeAspect="1"/>
+          </p:cNvPicPr>
+          <p:nvPr/>
+        </p:nvPicPr>
+        <p:blipFill>
+          <a:blip r:embed="rId3"/>
+          <a:stretch>
+            <a:fillRect/>
+          </a:stretch>
+        </p:blipFill>
+        <p:spPr>
+          <a:xfrm>
+            <a:off x="1788686" y="3789295"/>
+            <a:ext cx="4901609" cy="2475191"/>
+          </a:xfrm>
+          <a:prstGeom prst="rect">
+            <a:avLst/>
+          </a:prstGeom>
+        </p:spPr>
+      </p:pic>
     </p:spTree>
     <p:extLst>
       <p:ext uri="{BB962C8B-B14F-4D97-AF65-F5344CB8AC3E}">
-        <p14:creationId xmlns:p14="http://schemas.microsoft.com/office/powerpoint/2010/main" val="532156206"/>
+        <p14:creationId xmlns:p14="http://schemas.microsoft.com/office/powerpoint/2010/main" val="3468348417"/>
       </p:ext>
     </p:extLst>
   </p:cSld>
@@ -6033,7 +6110,7 @@
         </p:nvSpPr>
         <p:spPr>
           <a:xfrm>
-            <a:off x="1099133" y="69858"/>
+            <a:off x="1099133" y="78482"/>
             <a:ext cx="10058400" cy="830262"/>
           </a:xfrm>
         </p:spPr>
@@ -6062,8 +6139,8 @@
         </p:nvSpPr>
         <p:spPr>
           <a:xfrm>
-            <a:off x="1099133" y="810891"/>
-            <a:ext cx="10058400" cy="5816977"/>
+            <a:off x="517241" y="810891"/>
+            <a:ext cx="10058400" cy="2585323"/>
           </a:xfrm>
           <a:prstGeom prst="rect">
             <a:avLst/>
@@ -6110,24 +6187,22 @@
               <a:buChar char="•"/>
             </a:pPr>
             <a:r>
-              <a:rPr lang="en-US" sz="1600" b="1" i="0" dirty="0">
-                <a:solidFill>
-                  <a:srgbClr val="2B2B2B"/>
-                </a:solidFill>
-                <a:effectLst/>
-                <a:latin typeface="Roboto" panose="02000000000000000000" pitchFamily="2" charset="0"/>
-              </a:rPr>
-              <a:t>Optimization 4 </a:t>
-            </a:r>
-            <a:r>
-              <a:rPr lang="en-US" sz="1600" b="0" i="0" dirty="0">
-                <a:solidFill>
-                  <a:srgbClr val="2B2B2B"/>
-                </a:solidFill>
-                <a:effectLst/>
-                <a:latin typeface="Roboto" panose="02000000000000000000" pitchFamily="2" charset="0"/>
-              </a:rPr>
-              <a:t>– created more bins</a:t>
+              <a:rPr lang="en-US" sz="1600" b="1" dirty="0">
+                <a:solidFill>
+                  <a:srgbClr val="2B2B2B"/>
+                </a:solidFill>
+                <a:latin typeface="Roboto" panose="02000000000000000000" pitchFamily="2" charset="0"/>
+              </a:rPr>
+              <a:t>Optimization 2 </a:t>
+            </a:r>
+            <a:r>
+              <a:rPr lang="en-US" sz="1600" dirty="0">
+                <a:solidFill>
+                  <a:srgbClr val="2B2B2B"/>
+                </a:solidFill>
+                <a:latin typeface="Roboto" panose="02000000000000000000" pitchFamily="2" charset="0"/>
+              </a:rPr>
+              <a:t>– increased the nodes and the epochs</a:t>
             </a:r>
           </a:p>
           <a:p>
@@ -6157,7 +6232,43 @@
                 </a:solidFill>
                 <a:latin typeface="Roboto" panose="02000000000000000000" pitchFamily="2" charset="0"/>
               </a:rPr>
-              <a:t>Changed app count cut-off from 500 to 1000</a:t>
+              <a:t>1</a:t>
+            </a:r>
+            <a:r>
+              <a:rPr lang="en-US" sz="1600" baseline="30000" dirty="0">
+                <a:solidFill>
+                  <a:srgbClr val="2B2B2B"/>
+                </a:solidFill>
+                <a:latin typeface="Roboto" panose="02000000000000000000" pitchFamily="2" charset="0"/>
+              </a:rPr>
+              <a:t>st</a:t>
+            </a:r>
+            <a:r>
+              <a:rPr lang="en-US" sz="1600" dirty="0">
+                <a:solidFill>
+                  <a:srgbClr val="2B2B2B"/>
+                </a:solidFill>
+                <a:latin typeface="Roboto" panose="02000000000000000000" pitchFamily="2" charset="0"/>
+              </a:rPr>
+              <a:t> layer – 100 neurons with </a:t>
+            </a:r>
+            <a:r>
+              <a:rPr lang="en-US" sz="1600" dirty="0" err="1">
+                <a:solidFill>
+                  <a:srgbClr val="2B2B2B"/>
+                </a:solidFill>
+                <a:latin typeface="Roboto" panose="02000000000000000000" pitchFamily="2" charset="0"/>
+              </a:rPr>
+              <a:t>ReLU</a:t>
+            </a:r>
+            <a:r>
+              <a:rPr lang="en-US" sz="1600" dirty="0">
+                <a:solidFill>
+                  <a:srgbClr val="2B2B2B"/>
+                </a:solidFill>
+                <a:latin typeface="Roboto" panose="02000000000000000000" pitchFamily="2" charset="0"/>
+              </a:rPr>
+              <a:t> activation</a:t>
             </a:r>
           </a:p>
           <a:p>
@@ -6172,7 +6283,43 @@
                 </a:solidFill>
                 <a:latin typeface="Roboto" panose="02000000000000000000" pitchFamily="2" charset="0"/>
               </a:rPr>
-              <a:t>Changed class count cut-off from 1000 to 2000</a:t>
+              <a:t>2</a:t>
+            </a:r>
+            <a:r>
+              <a:rPr lang="en-US" sz="1600" baseline="30000" dirty="0">
+                <a:solidFill>
+                  <a:srgbClr val="2B2B2B"/>
+                </a:solidFill>
+                <a:latin typeface="Roboto" panose="02000000000000000000" pitchFamily="2" charset="0"/>
+              </a:rPr>
+              <a:t>nd</a:t>
+            </a:r>
+            <a:r>
+              <a:rPr lang="en-US" sz="1600" dirty="0">
+                <a:solidFill>
+                  <a:srgbClr val="2B2B2B"/>
+                </a:solidFill>
+                <a:latin typeface="Roboto" panose="02000000000000000000" pitchFamily="2" charset="0"/>
+              </a:rPr>
+              <a:t> layer – 50 neurons with </a:t>
+            </a:r>
+            <a:r>
+              <a:rPr lang="en-US" sz="1600" dirty="0" err="1">
+                <a:solidFill>
+                  <a:srgbClr val="2B2B2B"/>
+                </a:solidFill>
+                <a:latin typeface="Roboto" panose="02000000000000000000" pitchFamily="2" charset="0"/>
+              </a:rPr>
+              <a:t>ReLU</a:t>
+            </a:r>
+            <a:r>
+              <a:rPr lang="en-US" sz="1600" dirty="0">
+                <a:solidFill>
+                  <a:srgbClr val="2B2B2B"/>
+                </a:solidFill>
+                <a:latin typeface="Roboto" panose="02000000000000000000" pitchFamily="2" charset="0"/>
+              </a:rPr>
+              <a:t> activation</a:t>
             </a:r>
           </a:p>
           <a:p>
@@ -6187,7 +6334,7 @@
                 </a:solidFill>
                 <a:latin typeface="Roboto" panose="02000000000000000000" pitchFamily="2" charset="0"/>
               </a:rPr>
-              <a:t>1</a:t>
+              <a:t>3</a:t>
             </a:r>
             <a:r>
               <a:rPr lang="en-US" sz="1600" baseline="30000" dirty="0">
@@ -6196,7 +6343,7 @@
                 </a:solidFill>
                 <a:latin typeface="Roboto" panose="02000000000000000000" pitchFamily="2" charset="0"/>
               </a:rPr>
-              <a:t>st</a:t>
+              <a:t>rd</a:t>
             </a:r>
             <a:r>
               <a:rPr lang="en-US" sz="1600" dirty="0">
@@ -6205,7 +6352,7 @@
                 </a:solidFill>
                 <a:latin typeface="Roboto" panose="02000000000000000000" pitchFamily="2" charset="0"/>
               </a:rPr>
-              <a:t> layer – 100 neurons with </a:t>
+              <a:t> layer – 25 neurons with </a:t>
             </a:r>
             <a:r>
               <a:rPr lang="en-US" sz="1600" dirty="0" err="1">
@@ -6238,43 +6385,7 @@
                 </a:solidFill>
                 <a:latin typeface="Roboto" panose="02000000000000000000" pitchFamily="2" charset="0"/>
               </a:rPr>
-              <a:t>2</a:t>
-            </a:r>
-            <a:r>
-              <a:rPr lang="en-US" sz="1600" baseline="30000" dirty="0">
-                <a:solidFill>
-                  <a:srgbClr val="2B2B2B"/>
-                </a:solidFill>
-                <a:latin typeface="Roboto" panose="02000000000000000000" pitchFamily="2" charset="0"/>
-              </a:rPr>
-              <a:t>nd</a:t>
-            </a:r>
-            <a:r>
-              <a:rPr lang="en-US" sz="1600" dirty="0">
-                <a:solidFill>
-                  <a:srgbClr val="2B2B2B"/>
-                </a:solidFill>
-                <a:latin typeface="Roboto" panose="02000000000000000000" pitchFamily="2" charset="0"/>
-              </a:rPr>
-              <a:t> layer – 50 neurons with </a:t>
-            </a:r>
-            <a:r>
-              <a:rPr lang="en-US" sz="1600" dirty="0" err="1">
-                <a:solidFill>
-                  <a:srgbClr val="2B2B2B"/>
-                </a:solidFill>
-                <a:latin typeface="Roboto" panose="02000000000000000000" pitchFamily="2" charset="0"/>
-              </a:rPr>
-              <a:t>ReLU</a:t>
-            </a:r>
-            <a:r>
-              <a:rPr lang="en-US" sz="1600" dirty="0">
-                <a:solidFill>
-                  <a:srgbClr val="2B2B2B"/>
-                </a:solidFill>
-                <a:latin typeface="Roboto" panose="02000000000000000000" pitchFamily="2" charset="0"/>
-              </a:rPr>
-              <a:t> activation</a:t>
+              <a:t>Output layer – 1 neuron with Sigmoid activation</a:t>
             </a:r>
           </a:p>
           <a:p>
@@ -6289,43 +6400,7 @@
                 </a:solidFill>
                 <a:latin typeface="Roboto" panose="02000000000000000000" pitchFamily="2" charset="0"/>
               </a:rPr>
-              <a:t>3</a:t>
-            </a:r>
-            <a:r>
-              <a:rPr lang="en-US" sz="1600" baseline="30000" dirty="0">
-                <a:solidFill>
-                  <a:srgbClr val="2B2B2B"/>
-                </a:solidFill>
-                <a:latin typeface="Roboto" panose="02000000000000000000" pitchFamily="2" charset="0"/>
-              </a:rPr>
-              <a:t>rd</a:t>
-            </a:r>
-            <a:r>
-              <a:rPr lang="en-US" sz="1600" dirty="0">
-                <a:solidFill>
-                  <a:srgbClr val="2B2B2B"/>
-                </a:solidFill>
-                <a:latin typeface="Roboto" panose="02000000000000000000" pitchFamily="2" charset="0"/>
-              </a:rPr>
-              <a:t> layer – 25 neurons with </a:t>
-            </a:r>
-            <a:r>
-              <a:rPr lang="en-US" sz="1600" dirty="0" err="1">
-                <a:solidFill>
-                  <a:srgbClr val="2B2B2B"/>
-                </a:solidFill>
-                <a:latin typeface="Roboto" panose="02000000000000000000" pitchFamily="2" charset="0"/>
-              </a:rPr>
-              <a:t>ReLU</a:t>
-            </a:r>
-            <a:r>
-              <a:rPr lang="en-US" sz="1600" dirty="0">
-                <a:solidFill>
-                  <a:srgbClr val="2B2B2B"/>
-                </a:solidFill>
-                <a:latin typeface="Roboto" panose="02000000000000000000" pitchFamily="2" charset="0"/>
-              </a:rPr>
-              <a:t> activation</a:t>
+              <a:t>150 epochs</a:t>
             </a:r>
           </a:p>
           <a:p>
@@ -6340,339 +6415,88 @@
                 </a:solidFill>
                 <a:latin typeface="Roboto" panose="02000000000000000000" pitchFamily="2" charset="0"/>
               </a:rPr>
-              <a:t>Output layer – 1 neuron with Sigmoid activation</a:t>
-            </a:r>
-          </a:p>
-          <a:p>
-            <a:pPr marL="1657350" lvl="3" indent="-285750">
-              <a:buFont typeface="Arial" panose="020B0604020202020204" pitchFamily="34" charset="0"/>
-              <a:buChar char="•"/>
-            </a:pPr>
-            <a:r>
-              <a:rPr lang="en-US" sz="1600" dirty="0">
-                <a:solidFill>
-                  <a:srgbClr val="2B2B2B"/>
-                </a:solidFill>
-                <a:latin typeface="Roboto" panose="02000000000000000000" pitchFamily="2" charset="0"/>
-              </a:rPr>
-              <a:t>100 epochs</a:t>
-            </a:r>
-          </a:p>
-          <a:p>
-            <a:pPr marL="1657350" lvl="3" indent="-285750">
-              <a:buFont typeface="Arial" panose="020B0604020202020204" pitchFamily="34" charset="0"/>
-              <a:buChar char="•"/>
-            </a:pPr>
-            <a:r>
-              <a:rPr lang="en-US" sz="1600" dirty="0">
-                <a:solidFill>
-                  <a:srgbClr val="2B2B2B"/>
-                </a:solidFill>
-                <a:latin typeface="Roboto" panose="02000000000000000000" pitchFamily="2" charset="0"/>
-              </a:rPr>
-              <a:t>Accuracy – 72.75% - slightly less than earlier Optimizations</a:t>
-            </a:r>
-            <a:endParaRPr lang="en-US" sz="1600" b="0" i="0" dirty="0">
-              <a:solidFill>
-                <a:srgbClr val="2B2B2B"/>
-              </a:solidFill>
-              <a:effectLst/>
-              <a:latin typeface="Roboto" panose="02000000000000000000" pitchFamily="2" charset="0"/>
-            </a:endParaRPr>
-          </a:p>
-          <a:p>
-            <a:pPr marL="1200150" lvl="2" indent="-285750">
-              <a:buFont typeface="Arial" panose="020B0604020202020204" pitchFamily="34" charset="0"/>
-              <a:buChar char="•"/>
-            </a:pPr>
-            <a:r>
-              <a:rPr lang="en-US" sz="1600" b="1" dirty="0">
-                <a:solidFill>
-                  <a:srgbClr val="2B2B2B"/>
-                </a:solidFill>
-                <a:latin typeface="Roboto" panose="02000000000000000000" pitchFamily="2" charset="0"/>
-              </a:rPr>
-              <a:t>Optimization 5 </a:t>
-            </a:r>
-            <a:r>
-              <a:rPr lang="en-US" sz="1600" dirty="0">
-                <a:solidFill>
-                  <a:srgbClr val="2B2B2B"/>
-                </a:solidFill>
-                <a:latin typeface="Roboto" panose="02000000000000000000" pitchFamily="2" charset="0"/>
-              </a:rPr>
-              <a:t>– Did not drop the NAME column and binned the NAME data</a:t>
-            </a:r>
-          </a:p>
-          <a:p>
-            <a:pPr marL="1657350" lvl="3" indent="-285750">
-              <a:buFont typeface="Arial" panose="020B0604020202020204" pitchFamily="34" charset="0"/>
-              <a:buChar char="•"/>
-            </a:pPr>
-            <a:r>
-              <a:rPr lang="en-US" sz="1600" dirty="0">
-                <a:solidFill>
-                  <a:srgbClr val="2B2B2B"/>
-                </a:solidFill>
-                <a:latin typeface="Roboto" panose="02000000000000000000" pitchFamily="2" charset="0"/>
-              </a:rPr>
-              <a:t>Dropped Name Column</a:t>
-            </a:r>
-          </a:p>
-          <a:p>
-            <a:pPr marL="1657350" lvl="3" indent="-285750">
-              <a:buFont typeface="Arial" panose="020B0604020202020204" pitchFamily="34" charset="0"/>
-              <a:buChar char="•"/>
-            </a:pPr>
-            <a:r>
-              <a:rPr lang="en-US" sz="1600" dirty="0">
-                <a:solidFill>
-                  <a:srgbClr val="2B2B2B"/>
-                </a:solidFill>
-                <a:latin typeface="Roboto" panose="02000000000000000000" pitchFamily="2" charset="0"/>
-              </a:rPr>
-              <a:t>Changed app count cut-off back to 500</a:t>
-            </a:r>
-          </a:p>
-          <a:p>
-            <a:pPr marL="1657350" lvl="3" indent="-285750">
-              <a:buFont typeface="Arial" panose="020B0604020202020204" pitchFamily="34" charset="0"/>
-              <a:buChar char="•"/>
-            </a:pPr>
-            <a:r>
-              <a:rPr lang="en-US" sz="1600" dirty="0">
-                <a:solidFill>
-                  <a:srgbClr val="2B2B2B"/>
-                </a:solidFill>
-                <a:latin typeface="Roboto" panose="02000000000000000000" pitchFamily="2" charset="0"/>
-              </a:rPr>
-              <a:t>Changed class count cut-off back to 1000</a:t>
-            </a:r>
-          </a:p>
-          <a:p>
-            <a:pPr marL="1657350" lvl="3" indent="-285750">
-              <a:buFont typeface="Arial" panose="020B0604020202020204" pitchFamily="34" charset="0"/>
-              <a:buChar char="•"/>
-            </a:pPr>
-            <a:r>
-              <a:rPr lang="en-US" sz="1600" dirty="0">
-                <a:solidFill>
-                  <a:srgbClr val="2B2B2B"/>
-                </a:solidFill>
-                <a:latin typeface="Roboto" panose="02000000000000000000" pitchFamily="2" charset="0"/>
-              </a:rPr>
-              <a:t>1</a:t>
-            </a:r>
-            <a:r>
-              <a:rPr lang="en-US" sz="1600" baseline="30000" dirty="0">
-                <a:solidFill>
-                  <a:srgbClr val="2B2B2B"/>
-                </a:solidFill>
-                <a:latin typeface="Roboto" panose="02000000000000000000" pitchFamily="2" charset="0"/>
-              </a:rPr>
-              <a:t>st</a:t>
-            </a:r>
-            <a:r>
-              <a:rPr lang="en-US" sz="1600" dirty="0">
-                <a:solidFill>
-                  <a:srgbClr val="2B2B2B"/>
-                </a:solidFill>
-                <a:latin typeface="Roboto" panose="02000000000000000000" pitchFamily="2" charset="0"/>
-              </a:rPr>
-              <a:t> layer – 100 neurons with </a:t>
-            </a:r>
-            <a:r>
-              <a:rPr lang="en-US" sz="1600" dirty="0" err="1">
-                <a:solidFill>
-                  <a:srgbClr val="2B2B2B"/>
-                </a:solidFill>
-                <a:latin typeface="Roboto" panose="02000000000000000000" pitchFamily="2" charset="0"/>
-              </a:rPr>
-              <a:t>ReLU</a:t>
-            </a:r>
-            <a:r>
-              <a:rPr lang="en-US" sz="1600" dirty="0">
-                <a:solidFill>
-                  <a:srgbClr val="2B2B2B"/>
-                </a:solidFill>
-                <a:latin typeface="Roboto" panose="02000000000000000000" pitchFamily="2" charset="0"/>
-              </a:rPr>
-              <a:t> activation</a:t>
-            </a:r>
-          </a:p>
-          <a:p>
-            <a:pPr marL="1657350" lvl="3" indent="-285750">
-              <a:buFont typeface="Arial" panose="020B0604020202020204" pitchFamily="34" charset="0"/>
-              <a:buChar char="•"/>
-            </a:pPr>
-            <a:r>
-              <a:rPr lang="en-US" sz="1600" dirty="0">
-                <a:solidFill>
-                  <a:srgbClr val="2B2B2B"/>
-                </a:solidFill>
-                <a:latin typeface="Roboto" panose="02000000000000000000" pitchFamily="2" charset="0"/>
-              </a:rPr>
-              <a:t>2</a:t>
-            </a:r>
-            <a:r>
-              <a:rPr lang="en-US" sz="1600" baseline="30000" dirty="0">
-                <a:solidFill>
-                  <a:srgbClr val="2B2B2B"/>
-                </a:solidFill>
-                <a:latin typeface="Roboto" panose="02000000000000000000" pitchFamily="2" charset="0"/>
-              </a:rPr>
-              <a:t>nd</a:t>
-            </a:r>
-            <a:r>
-              <a:rPr lang="en-US" sz="1600" dirty="0">
-                <a:solidFill>
-                  <a:srgbClr val="2B2B2B"/>
-                </a:solidFill>
-                <a:latin typeface="Roboto" panose="02000000000000000000" pitchFamily="2" charset="0"/>
-              </a:rPr>
-              <a:t> layer – 50 neurons with </a:t>
-            </a:r>
-            <a:r>
-              <a:rPr lang="en-US" sz="1600" dirty="0" err="1">
-                <a:solidFill>
-                  <a:srgbClr val="2B2B2B"/>
-                </a:solidFill>
-                <a:latin typeface="Roboto" panose="02000000000000000000" pitchFamily="2" charset="0"/>
-              </a:rPr>
-              <a:t>ReLU</a:t>
-            </a:r>
-            <a:r>
-              <a:rPr lang="en-US" sz="1600" dirty="0">
-                <a:solidFill>
-                  <a:srgbClr val="2B2B2B"/>
-                </a:solidFill>
-                <a:latin typeface="Roboto" panose="02000000000000000000" pitchFamily="2" charset="0"/>
-              </a:rPr>
-              <a:t> activation</a:t>
-            </a:r>
-          </a:p>
-          <a:p>
-            <a:pPr marL="1657350" lvl="3" indent="-285750">
-              <a:buFont typeface="Arial" panose="020B0604020202020204" pitchFamily="34" charset="0"/>
-              <a:buChar char="•"/>
-            </a:pPr>
-            <a:r>
-              <a:rPr lang="en-US" sz="1600" dirty="0">
-                <a:solidFill>
-                  <a:srgbClr val="2B2B2B"/>
-                </a:solidFill>
-                <a:latin typeface="Roboto" panose="02000000000000000000" pitchFamily="2" charset="0"/>
-              </a:rPr>
-              <a:t>3</a:t>
-            </a:r>
-            <a:r>
-              <a:rPr lang="en-US" sz="1600" baseline="30000" dirty="0">
-                <a:solidFill>
-                  <a:srgbClr val="2B2B2B"/>
-                </a:solidFill>
-                <a:latin typeface="Roboto" panose="02000000000000000000" pitchFamily="2" charset="0"/>
-              </a:rPr>
-              <a:t>rd</a:t>
-            </a:r>
-            <a:r>
-              <a:rPr lang="en-US" sz="1600" dirty="0">
-                <a:solidFill>
-                  <a:srgbClr val="2B2B2B"/>
-                </a:solidFill>
-                <a:latin typeface="Roboto" panose="02000000000000000000" pitchFamily="2" charset="0"/>
-              </a:rPr>
-              <a:t> layer – 25 neurons with </a:t>
-            </a:r>
-            <a:r>
-              <a:rPr lang="en-US" sz="1600" dirty="0" err="1">
-                <a:solidFill>
-                  <a:srgbClr val="2B2B2B"/>
-                </a:solidFill>
-                <a:latin typeface="Roboto" panose="02000000000000000000" pitchFamily="2" charset="0"/>
-              </a:rPr>
-              <a:t>ReLU</a:t>
-            </a:r>
-            <a:r>
-              <a:rPr lang="en-US" sz="1600" dirty="0">
-                <a:solidFill>
-                  <a:srgbClr val="2B2B2B"/>
-                </a:solidFill>
-                <a:latin typeface="Roboto" panose="02000000000000000000" pitchFamily="2" charset="0"/>
-              </a:rPr>
-              <a:t> activation</a:t>
-            </a:r>
-          </a:p>
-          <a:p>
-            <a:pPr marL="1657350" lvl="3" indent="-285750">
-              <a:buFont typeface="Arial" panose="020B0604020202020204" pitchFamily="34" charset="0"/>
-              <a:buChar char="•"/>
-            </a:pPr>
-            <a:r>
-              <a:rPr lang="en-US" sz="1600" dirty="0">
-                <a:solidFill>
-                  <a:srgbClr val="2B2B2B"/>
-                </a:solidFill>
-                <a:latin typeface="Roboto" panose="02000000000000000000" pitchFamily="2" charset="0"/>
-              </a:rPr>
-              <a:t>Output layer – 1 neuron with Sigmoid activation</a:t>
-            </a:r>
-          </a:p>
-          <a:p>
-            <a:pPr marL="1657350" lvl="3" indent="-285750">
-              <a:buFont typeface="Arial" panose="020B0604020202020204" pitchFamily="34" charset="0"/>
-              <a:buChar char="•"/>
-            </a:pPr>
-            <a:r>
-              <a:rPr lang="en-US" sz="1600" dirty="0">
-                <a:solidFill>
-                  <a:srgbClr val="2B2B2B"/>
-                </a:solidFill>
-                <a:latin typeface="Roboto" panose="02000000000000000000" pitchFamily="2" charset="0"/>
-              </a:rPr>
-              <a:t>100 epochs</a:t>
-            </a:r>
-          </a:p>
-          <a:p>
-            <a:pPr marL="1657350" lvl="3" indent="-285750">
-              <a:buFont typeface="Arial" panose="020B0604020202020204" pitchFamily="34" charset="0"/>
-              <a:buChar char="•"/>
-            </a:pPr>
-            <a:r>
-              <a:rPr lang="en-US" sz="1600" dirty="0">
-                <a:solidFill>
-                  <a:srgbClr val="2B2B2B"/>
-                </a:solidFill>
-                <a:latin typeface="Roboto" panose="02000000000000000000" pitchFamily="2" charset="0"/>
-              </a:rPr>
-              <a:t>Accuracy – 78.83% - achieved over the target accuracy of 75%</a:t>
-            </a:r>
-            <a:endParaRPr lang="en-US" sz="1600" b="0" i="0" dirty="0">
-              <a:solidFill>
-                <a:srgbClr val="2B2B2B"/>
-              </a:solidFill>
-              <a:effectLst/>
-              <a:latin typeface="Roboto" panose="02000000000000000000" pitchFamily="2" charset="0"/>
-            </a:endParaRPr>
-          </a:p>
-          <a:p>
-            <a:pPr marL="1657350" lvl="3" indent="-285750">
-              <a:buFont typeface="Arial" panose="020B0604020202020204" pitchFamily="34" charset="0"/>
-              <a:buChar char="•"/>
-            </a:pPr>
-            <a:endParaRPr lang="en-US" b="0" i="0" dirty="0">
-              <a:solidFill>
-                <a:srgbClr val="2B2B2B"/>
-              </a:solidFill>
-              <a:effectLst/>
-              <a:latin typeface="Roboto" panose="02000000000000000000" pitchFamily="2" charset="0"/>
-            </a:endParaRPr>
+              <a:t>72.96% Accuracy – slightly more accurate</a:t>
+            </a:r>
           </a:p>
         </p:txBody>
       </p:sp>
+      <p:pic>
+        <p:nvPicPr>
+          <p:cNvPr id="5" name="Picture 4">
+            <a:extLst>
+              <a:ext uri="{FF2B5EF4-FFF2-40B4-BE49-F238E27FC236}">
+                <a16:creationId xmlns:a16="http://schemas.microsoft.com/office/drawing/2014/main" id="{FB8DCE14-085A-1920-B14C-D5074E5E1869}"/>
+              </a:ext>
+            </a:extLst>
+          </p:cNvPr>
+          <p:cNvPicPr>
+            <a:picLocks noChangeAspect="1"/>
+          </p:cNvPicPr>
+          <p:nvPr/>
+        </p:nvPicPr>
+        <p:blipFill rotWithShape="1">
+          <a:blip r:embed="rId2"/>
+          <a:srcRect l="3032" t="54616" r="58483" b="11417"/>
+          <a:stretch/>
+        </p:blipFill>
+        <p:spPr>
+          <a:xfrm>
+            <a:off x="1676406" y="3931980"/>
+            <a:ext cx="4692072" cy="2225965"/>
+          </a:xfrm>
+          <a:prstGeom prst="rect">
+            <a:avLst/>
+          </a:prstGeom>
+          <a:effectLst>
+            <a:outerShdw blurRad="63500" sx="102000" sy="102000" algn="ctr" rotWithShape="0">
+              <a:prstClr val="black">
+                <a:alpha val="40000"/>
+              </a:prstClr>
+            </a:outerShdw>
+          </a:effectLst>
+        </p:spPr>
+      </p:pic>
+      <p:pic>
+        <p:nvPicPr>
+          <p:cNvPr id="10" name="Picture 9">
+            <a:extLst>
+              <a:ext uri="{FF2B5EF4-FFF2-40B4-BE49-F238E27FC236}">
+                <a16:creationId xmlns:a16="http://schemas.microsoft.com/office/drawing/2014/main" id="{ACB9BA77-A1B1-2D76-23FF-2EFCE1AC071F}"/>
+              </a:ext>
+            </a:extLst>
+          </p:cNvPr>
+          <p:cNvPicPr>
+            <a:picLocks noChangeAspect="1"/>
+          </p:cNvPicPr>
+          <p:nvPr/>
+        </p:nvPicPr>
+        <p:blipFill>
+          <a:blip r:embed="rId3"/>
+          <a:stretch>
+            <a:fillRect/>
+          </a:stretch>
+        </p:blipFill>
+        <p:spPr>
+          <a:xfrm>
+            <a:off x="6742545" y="1626886"/>
+            <a:ext cx="5204440" cy="4531059"/>
+          </a:xfrm>
+          <a:prstGeom prst="rect">
+            <a:avLst/>
+          </a:prstGeom>
+          <a:effectLst>
+            <a:outerShdw blurRad="63500" sx="102000" sy="102000" algn="ctr" rotWithShape="0">
+              <a:prstClr val="black">
+                <a:alpha val="40000"/>
+              </a:prstClr>
+            </a:outerShdw>
+          </a:effectLst>
+        </p:spPr>
+      </p:pic>
     </p:spTree>
     <p:extLst>
       <p:ext uri="{BB962C8B-B14F-4D97-AF65-F5344CB8AC3E}">
-        <p14:creationId xmlns:p14="http://schemas.microsoft.com/office/powerpoint/2010/main" val="2142533285"/>
+        <p14:creationId xmlns:p14="http://schemas.microsoft.com/office/powerpoint/2010/main" val="532156206"/>
       </p:ext>
     </p:extLst>
   </p:cSld>
@@ -6712,17 +6536,22 @@
             <a:spLocks noGrp="1"/>
           </p:cNvSpPr>
           <p:nvPr>
-            <p:ph type="title"/>
+            <p:ph type="title" idx="4294967295"/>
           </p:nvPr>
         </p:nvSpPr>
-        <p:spPr/>
+        <p:spPr>
+          <a:xfrm>
+            <a:off x="1099133" y="78482"/>
+            <a:ext cx="10058400" cy="830262"/>
+          </a:xfrm>
+        </p:spPr>
         <p:txBody>
           <a:bodyPr/>
           <a:lstStyle/>
           <a:p>
             <a:r>
               <a:rPr lang="en-US" dirty="0"/>
-              <a:t>Alphabet Soup Analysis Results Summary</a:t>
+              <a:t>Alphabet Soup Analysis Results</a:t>
             </a:r>
           </a:p>
         </p:txBody>
@@ -6741,8 +6570,8 @@
         </p:nvSpPr>
         <p:spPr>
           <a:xfrm>
-            <a:off x="1097280" y="1897811"/>
-            <a:ext cx="10134312" cy="2031325"/>
+            <a:off x="517248" y="810891"/>
+            <a:ext cx="10058400" cy="3077766"/>
           </a:xfrm>
           <a:prstGeom prst="rect">
             <a:avLst/>
@@ -6757,63 +6586,772 @@
           <a:p>
             <a:pPr algn="l"/>
             <a:r>
-              <a:rPr lang="en-US" dirty="0">
-                <a:solidFill>
-                  <a:srgbClr val="2B2B2B"/>
-                </a:solidFill>
-                <a:latin typeface="Roboto" panose="02000000000000000000" pitchFamily="2" charset="0"/>
-              </a:rPr>
-              <a:t>Overall, by using machine learning, we can predict with almost 79% accuracy which campaigns will be successful.  This will help us fund campaigns more efficiently. </a:t>
-            </a:r>
-          </a:p>
+              <a:rPr lang="en-US" b="1" i="0" dirty="0">
+                <a:solidFill>
+                  <a:srgbClr val="2B2B2B"/>
+                </a:solidFill>
+                <a:effectLst/>
+                <a:latin typeface="Roboto" panose="02000000000000000000" pitchFamily="2" charset="0"/>
+              </a:rPr>
+              <a:t>Compiling, Training, and Evaluating the Model</a:t>
+            </a:r>
+          </a:p>
+          <a:p>
+            <a:pPr marL="742950" lvl="1" indent="-285750" algn="l">
+              <a:buFont typeface="Arial" panose="020B0604020202020204" pitchFamily="34" charset="0"/>
+              <a:buChar char="•"/>
+            </a:pPr>
+            <a:r>
+              <a:rPr lang="en-US" sz="1600" b="0" i="0" dirty="0">
+                <a:solidFill>
+                  <a:srgbClr val="2B2B2B"/>
+                </a:solidFill>
+                <a:effectLst/>
+                <a:latin typeface="Roboto" panose="02000000000000000000" pitchFamily="2" charset="0"/>
+              </a:rPr>
+              <a:t>I did 5 optimizations to get to the target of over 75% accuracy</a:t>
+            </a:r>
+          </a:p>
+          <a:p>
+            <a:pPr marL="1200150" lvl="2" indent="-285750">
+              <a:buFont typeface="Arial" panose="020B0604020202020204" pitchFamily="34" charset="0"/>
+              <a:buChar char="•"/>
+            </a:pPr>
+            <a:r>
+              <a:rPr lang="en-US" sz="1600" b="1" i="0" dirty="0">
+                <a:solidFill>
+                  <a:srgbClr val="2B2B2B"/>
+                </a:solidFill>
+                <a:effectLst/>
+                <a:latin typeface="Roboto" panose="02000000000000000000" pitchFamily="2" charset="0"/>
+              </a:rPr>
+              <a:t>Optimization </a:t>
+            </a:r>
+            <a:r>
+              <a:rPr lang="en-US" sz="1600" b="1" dirty="0">
+                <a:solidFill>
+                  <a:srgbClr val="2B2B2B"/>
+                </a:solidFill>
+                <a:latin typeface="Roboto" panose="02000000000000000000" pitchFamily="2" charset="0"/>
+              </a:rPr>
+              <a:t>3 </a:t>
+            </a:r>
+            <a:r>
+              <a:rPr lang="en-US" sz="1600" dirty="0">
+                <a:solidFill>
+                  <a:srgbClr val="2B2B2B"/>
+                </a:solidFill>
+                <a:latin typeface="Roboto" panose="02000000000000000000" pitchFamily="2" charset="0"/>
+              </a:rPr>
+              <a:t>– adjusted to fewer bins and reduced the epochs back to 100</a:t>
+            </a:r>
+          </a:p>
+          <a:p>
+            <a:pPr marL="1657350" lvl="3" indent="-285750">
+              <a:buFont typeface="Arial" panose="020B0604020202020204" pitchFamily="34" charset="0"/>
+              <a:buChar char="•"/>
+            </a:pPr>
+            <a:r>
+              <a:rPr lang="en-US" sz="1600" dirty="0">
+                <a:solidFill>
+                  <a:srgbClr val="2B2B2B"/>
+                </a:solidFill>
+                <a:latin typeface="Roboto" panose="02000000000000000000" pitchFamily="2" charset="0"/>
+              </a:rPr>
+              <a:t>Dropped EIN and Name Columns</a:t>
+            </a:r>
+          </a:p>
+          <a:p>
+            <a:pPr marL="1657350" lvl="3" indent="-285750">
+              <a:buFont typeface="Arial" panose="020B0604020202020204" pitchFamily="34" charset="0"/>
+              <a:buChar char="•"/>
+            </a:pPr>
+            <a:r>
+              <a:rPr lang="en-US" sz="1600" dirty="0">
+                <a:solidFill>
+                  <a:srgbClr val="2B2B2B"/>
+                </a:solidFill>
+                <a:latin typeface="Roboto" panose="02000000000000000000" pitchFamily="2" charset="0"/>
+              </a:rPr>
+              <a:t>Changed app count cut off from 500 to 50</a:t>
+            </a:r>
+          </a:p>
+          <a:p>
+            <a:pPr marL="1657350" lvl="3" indent="-285750">
+              <a:buFont typeface="Arial" panose="020B0604020202020204" pitchFamily="34" charset="0"/>
+              <a:buChar char="•"/>
+            </a:pPr>
+            <a:r>
+              <a:rPr lang="en-US" sz="1600" dirty="0">
+                <a:solidFill>
+                  <a:srgbClr val="2B2B2B"/>
+                </a:solidFill>
+                <a:latin typeface="Roboto" panose="02000000000000000000" pitchFamily="2" charset="0"/>
+              </a:rPr>
+              <a:t>Changed class count cut off from 1000 to 100</a:t>
+            </a:r>
+          </a:p>
+          <a:p>
+            <a:pPr marL="1657350" lvl="3" indent="-285750">
+              <a:buFont typeface="Arial" panose="020B0604020202020204" pitchFamily="34" charset="0"/>
+              <a:buChar char="•"/>
+            </a:pPr>
+            <a:r>
+              <a:rPr lang="en-US" sz="1600" dirty="0">
+                <a:solidFill>
+                  <a:srgbClr val="2B2B2B"/>
+                </a:solidFill>
+                <a:latin typeface="Roboto" panose="02000000000000000000" pitchFamily="2" charset="0"/>
+              </a:rPr>
+              <a:t>1</a:t>
+            </a:r>
+            <a:r>
+              <a:rPr lang="en-US" sz="1600" baseline="30000" dirty="0">
+                <a:solidFill>
+                  <a:srgbClr val="2B2B2B"/>
+                </a:solidFill>
+                <a:latin typeface="Roboto" panose="02000000000000000000" pitchFamily="2" charset="0"/>
+              </a:rPr>
+              <a:t>st</a:t>
+            </a:r>
+            <a:r>
+              <a:rPr lang="en-US" sz="1600" dirty="0">
+                <a:solidFill>
+                  <a:srgbClr val="2B2B2B"/>
+                </a:solidFill>
+                <a:latin typeface="Roboto" panose="02000000000000000000" pitchFamily="2" charset="0"/>
+              </a:rPr>
+              <a:t> layer – 100 neurons with </a:t>
+            </a:r>
+            <a:r>
+              <a:rPr lang="en-US" sz="1600" dirty="0" err="1">
+                <a:solidFill>
+                  <a:srgbClr val="2B2B2B"/>
+                </a:solidFill>
+                <a:latin typeface="Roboto" panose="02000000000000000000" pitchFamily="2" charset="0"/>
+              </a:rPr>
+              <a:t>ReLU</a:t>
+            </a:r>
+            <a:r>
+              <a:rPr lang="en-US" sz="1600" dirty="0">
+                <a:solidFill>
+                  <a:srgbClr val="2B2B2B"/>
+                </a:solidFill>
+                <a:latin typeface="Roboto" panose="02000000000000000000" pitchFamily="2" charset="0"/>
+              </a:rPr>
+              <a:t> activation</a:t>
+            </a:r>
+          </a:p>
+          <a:p>
+            <a:pPr marL="1657350" lvl="3" indent="-285750">
+              <a:buFont typeface="Arial" panose="020B0604020202020204" pitchFamily="34" charset="0"/>
+              <a:buChar char="•"/>
+            </a:pPr>
+            <a:r>
+              <a:rPr lang="en-US" sz="1600" dirty="0">
+                <a:solidFill>
+                  <a:srgbClr val="2B2B2B"/>
+                </a:solidFill>
+                <a:latin typeface="Roboto" panose="02000000000000000000" pitchFamily="2" charset="0"/>
+              </a:rPr>
+              <a:t>2</a:t>
+            </a:r>
+            <a:r>
+              <a:rPr lang="en-US" sz="1600" baseline="30000" dirty="0">
+                <a:solidFill>
+                  <a:srgbClr val="2B2B2B"/>
+                </a:solidFill>
+                <a:latin typeface="Roboto" panose="02000000000000000000" pitchFamily="2" charset="0"/>
+              </a:rPr>
+              <a:t>nd</a:t>
+            </a:r>
+            <a:r>
+              <a:rPr lang="en-US" sz="1600" dirty="0">
+                <a:solidFill>
+                  <a:srgbClr val="2B2B2B"/>
+                </a:solidFill>
+                <a:latin typeface="Roboto" panose="02000000000000000000" pitchFamily="2" charset="0"/>
+              </a:rPr>
+              <a:t> layer – 50 neurons with </a:t>
+            </a:r>
+            <a:r>
+              <a:rPr lang="en-US" sz="1600" dirty="0" err="1">
+                <a:solidFill>
+                  <a:srgbClr val="2B2B2B"/>
+                </a:solidFill>
+                <a:latin typeface="Roboto" panose="02000000000000000000" pitchFamily="2" charset="0"/>
+              </a:rPr>
+              <a:t>ReLU</a:t>
+            </a:r>
+            <a:r>
+              <a:rPr lang="en-US" sz="1600" dirty="0">
+                <a:solidFill>
+                  <a:srgbClr val="2B2B2B"/>
+                </a:solidFill>
+                <a:latin typeface="Roboto" panose="02000000000000000000" pitchFamily="2" charset="0"/>
+              </a:rPr>
+              <a:t> activation</a:t>
+            </a:r>
+          </a:p>
+          <a:p>
+            <a:pPr marL="1657350" lvl="3" indent="-285750">
+              <a:buFont typeface="Arial" panose="020B0604020202020204" pitchFamily="34" charset="0"/>
+              <a:buChar char="•"/>
+            </a:pPr>
+            <a:r>
+              <a:rPr lang="en-US" sz="1600" dirty="0">
+                <a:solidFill>
+                  <a:srgbClr val="2B2B2B"/>
+                </a:solidFill>
+                <a:latin typeface="Roboto" panose="02000000000000000000" pitchFamily="2" charset="0"/>
+              </a:rPr>
+              <a:t>3</a:t>
+            </a:r>
+            <a:r>
+              <a:rPr lang="en-US" sz="1600" baseline="30000" dirty="0">
+                <a:solidFill>
+                  <a:srgbClr val="2B2B2B"/>
+                </a:solidFill>
+                <a:latin typeface="Roboto" panose="02000000000000000000" pitchFamily="2" charset="0"/>
+              </a:rPr>
+              <a:t>rd</a:t>
+            </a:r>
+            <a:r>
+              <a:rPr lang="en-US" sz="1600" dirty="0">
+                <a:solidFill>
+                  <a:srgbClr val="2B2B2B"/>
+                </a:solidFill>
+                <a:latin typeface="Roboto" panose="02000000000000000000" pitchFamily="2" charset="0"/>
+              </a:rPr>
+              <a:t> layer – 25 neurons with </a:t>
+            </a:r>
+            <a:r>
+              <a:rPr lang="en-US" sz="1600" dirty="0" err="1">
+                <a:solidFill>
+                  <a:srgbClr val="2B2B2B"/>
+                </a:solidFill>
+                <a:latin typeface="Roboto" panose="02000000000000000000" pitchFamily="2" charset="0"/>
+              </a:rPr>
+              <a:t>ReLU</a:t>
+            </a:r>
+            <a:r>
+              <a:rPr lang="en-US" sz="1600" dirty="0">
+                <a:solidFill>
+                  <a:srgbClr val="2B2B2B"/>
+                </a:solidFill>
+                <a:latin typeface="Roboto" panose="02000000000000000000" pitchFamily="2" charset="0"/>
+              </a:rPr>
+              <a:t> activation</a:t>
+            </a:r>
+          </a:p>
+          <a:p>
+            <a:pPr marL="1657350" lvl="3" indent="-285750">
+              <a:buFont typeface="Arial" panose="020B0604020202020204" pitchFamily="34" charset="0"/>
+              <a:buChar char="•"/>
+            </a:pPr>
+            <a:r>
+              <a:rPr lang="en-US" sz="1600" dirty="0">
+                <a:solidFill>
+                  <a:srgbClr val="2B2B2B"/>
+                </a:solidFill>
+                <a:latin typeface="Roboto" panose="02000000000000000000" pitchFamily="2" charset="0"/>
+              </a:rPr>
+              <a:t>Output layer – 1 neuron with Sigmoid activation</a:t>
+            </a:r>
+          </a:p>
+          <a:p>
+            <a:pPr marL="1657350" lvl="3" indent="-285750">
+              <a:buFont typeface="Arial" panose="020B0604020202020204" pitchFamily="34" charset="0"/>
+              <a:buChar char="•"/>
+            </a:pPr>
+            <a:r>
+              <a:rPr lang="en-US" sz="1600" dirty="0">
+                <a:solidFill>
+                  <a:srgbClr val="2B2B2B"/>
+                </a:solidFill>
+                <a:latin typeface="Roboto" panose="02000000000000000000" pitchFamily="2" charset="0"/>
+              </a:rPr>
+              <a:t>100 epochs</a:t>
+            </a:r>
+          </a:p>
+          <a:p>
+            <a:pPr marL="1657350" lvl="3" indent="-285750">
+              <a:buFont typeface="Arial" panose="020B0604020202020204" pitchFamily="34" charset="0"/>
+              <a:buChar char="•"/>
+            </a:pPr>
+            <a:r>
+              <a:rPr lang="en-US" sz="1600" dirty="0">
+                <a:solidFill>
+                  <a:srgbClr val="2B2B2B"/>
+                </a:solidFill>
+                <a:latin typeface="Roboto" panose="02000000000000000000" pitchFamily="2" charset="0"/>
+              </a:rPr>
+              <a:t>72.91% Accuracy - slightly less than Optimization 2</a:t>
+            </a:r>
+          </a:p>
+        </p:txBody>
+      </p:sp>
+      <p:pic>
+        <p:nvPicPr>
+          <p:cNvPr id="5" name="Picture 4">
+            <a:extLst>
+              <a:ext uri="{FF2B5EF4-FFF2-40B4-BE49-F238E27FC236}">
+                <a16:creationId xmlns:a16="http://schemas.microsoft.com/office/drawing/2014/main" id="{0FC753BB-D743-B80C-3FE1-0AFBCF061041}"/>
+              </a:ext>
+            </a:extLst>
+          </p:cNvPr>
+          <p:cNvPicPr>
+            <a:picLocks noChangeAspect="1"/>
+          </p:cNvPicPr>
+          <p:nvPr/>
+        </p:nvPicPr>
+        <p:blipFill rotWithShape="1">
+          <a:blip r:embed="rId2"/>
+          <a:srcRect l="2938" t="56653" r="58015" b="10048"/>
+          <a:stretch/>
+        </p:blipFill>
+        <p:spPr>
+          <a:xfrm>
+            <a:off x="2039046" y="3989031"/>
+            <a:ext cx="4760536" cy="2182119"/>
+          </a:xfrm>
+          <a:prstGeom prst="rect">
+            <a:avLst/>
+          </a:prstGeom>
+          <a:effectLst>
+            <a:outerShdw blurRad="63500" sx="102000" sy="102000" algn="ctr" rotWithShape="0">
+              <a:prstClr val="black">
+                <a:alpha val="40000"/>
+              </a:prstClr>
+            </a:outerShdw>
+          </a:effectLst>
+        </p:spPr>
+      </p:pic>
+      <p:pic>
+        <p:nvPicPr>
+          <p:cNvPr id="8" name="Picture 7">
+            <a:extLst>
+              <a:ext uri="{FF2B5EF4-FFF2-40B4-BE49-F238E27FC236}">
+                <a16:creationId xmlns:a16="http://schemas.microsoft.com/office/drawing/2014/main" id="{711EA611-52C3-3456-0D51-10A9B8881890}"/>
+              </a:ext>
+            </a:extLst>
+          </p:cNvPr>
+          <p:cNvPicPr>
+            <a:picLocks noChangeAspect="1"/>
+          </p:cNvPicPr>
+          <p:nvPr/>
+        </p:nvPicPr>
+        <p:blipFill>
+          <a:blip r:embed="rId3"/>
+          <a:stretch>
+            <a:fillRect/>
+          </a:stretch>
+        </p:blipFill>
+        <p:spPr>
+          <a:xfrm>
+            <a:off x="6972959" y="1833819"/>
+            <a:ext cx="5076403" cy="4337331"/>
+          </a:xfrm>
+          <a:prstGeom prst="rect">
+            <a:avLst/>
+          </a:prstGeom>
+          <a:effectLst>
+            <a:outerShdw blurRad="63500" sx="102000" sy="102000" algn="ctr" rotWithShape="0">
+              <a:prstClr val="black">
+                <a:alpha val="40000"/>
+              </a:prstClr>
+            </a:outerShdw>
+          </a:effectLst>
+        </p:spPr>
+      </p:pic>
+    </p:spTree>
+    <p:extLst>
+      <p:ext uri="{BB962C8B-B14F-4D97-AF65-F5344CB8AC3E}">
+        <p14:creationId xmlns:p14="http://schemas.microsoft.com/office/powerpoint/2010/main" val="1338354364"/>
+      </p:ext>
+    </p:extLst>
+  </p:cSld>
+  <p:clrMapOvr>
+    <a:masterClrMapping/>
+  </p:clrMapOvr>
+</p:sld>
+</file>
+
+<file path=ppt/slides/slide8.xml><?xml version="1.0" encoding="utf-8"?>
+<p:sld xmlns:a="http://schemas.openxmlformats.org/drawingml/2006/main" xmlns:r="http://schemas.openxmlformats.org/officeDocument/2006/relationships" xmlns:p="http://schemas.openxmlformats.org/presentationml/2006/main">
+  <p:cSld>
+    <p:spTree>
+      <p:nvGrpSpPr>
+        <p:cNvPr id="1" name=""/>
+        <p:cNvGrpSpPr/>
+        <p:nvPr/>
+      </p:nvGrpSpPr>
+      <p:grpSpPr>
+        <a:xfrm>
+          <a:off x="0" y="0"/>
+          <a:ext cx="0" cy="0"/>
+          <a:chOff x="0" y="0"/>
+          <a:chExt cx="0" cy="0"/>
+        </a:xfrm>
+      </p:grpSpPr>
+      <p:sp>
+        <p:nvSpPr>
+          <p:cNvPr id="2" name="Title 1">
+            <a:extLst>
+              <a:ext uri="{FF2B5EF4-FFF2-40B4-BE49-F238E27FC236}">
+                <a16:creationId xmlns:a16="http://schemas.microsoft.com/office/drawing/2014/main" id="{239116D8-A839-3D25-F7BF-A9B1C7A46B65}"/>
+              </a:ext>
+            </a:extLst>
+          </p:cNvPr>
+          <p:cNvSpPr>
+            <a:spLocks noGrp="1"/>
+          </p:cNvSpPr>
+          <p:nvPr>
+            <p:ph type="title" idx="4294967295"/>
+          </p:nvPr>
+        </p:nvSpPr>
+        <p:spPr>
+          <a:xfrm>
+            <a:off x="1099133" y="69858"/>
+            <a:ext cx="10058400" cy="830262"/>
+          </a:xfrm>
+        </p:spPr>
+        <p:txBody>
+          <a:bodyPr/>
+          <a:lstStyle/>
+          <a:p>
+            <a:r>
+              <a:rPr lang="en-US" dirty="0"/>
+              <a:t>Alphabet Soup Analysis Results</a:t>
+            </a:r>
+          </a:p>
+        </p:txBody>
+      </p:sp>
+      <p:sp>
+        <p:nvSpPr>
+          <p:cNvPr id="3" name="TextBox 2">
+            <a:extLst>
+              <a:ext uri="{FF2B5EF4-FFF2-40B4-BE49-F238E27FC236}">
+                <a16:creationId xmlns:a16="http://schemas.microsoft.com/office/drawing/2014/main" id="{073306BE-897D-599C-1207-6F2819D07E18}"/>
+              </a:ext>
+            </a:extLst>
+          </p:cNvPr>
+          <p:cNvSpPr txBox="1"/>
+          <p:nvPr/>
+        </p:nvSpPr>
+        <p:spPr>
+          <a:xfrm>
+            <a:off x="508008" y="810891"/>
+            <a:ext cx="10058400" cy="3354765"/>
+          </a:xfrm>
+          <a:prstGeom prst="rect">
+            <a:avLst/>
+          </a:prstGeom>
+          <a:noFill/>
+        </p:spPr>
+        <p:txBody>
+          <a:bodyPr wrap="square" rtlCol="0">
+            <a:spAutoFit/>
+          </a:bodyPr>
+          <a:lstStyle/>
           <a:p>
             <a:pPr algn="l"/>
             <a:r>
-              <a:rPr lang="en-US" dirty="0">
-                <a:solidFill>
-                  <a:srgbClr val="2B2B2B"/>
-                </a:solidFill>
-                <a:latin typeface="Roboto" panose="02000000000000000000" pitchFamily="2" charset="0"/>
-              </a:rPr>
-              <a:t>It would be ideal to continue to try other models to improve the accuracy even more.   </a:t>
-            </a:r>
-          </a:p>
-          <a:p>
-            <a:pPr algn="l"/>
-            <a:r>
-              <a:rPr lang="en-US" i="0" dirty="0">
+              <a:rPr lang="en-US" b="1" i="0" dirty="0">
                 <a:solidFill>
                   <a:srgbClr val="2B2B2B"/>
                 </a:solidFill>
                 <a:effectLst/>
                 <a:latin typeface="Roboto" panose="02000000000000000000" pitchFamily="2" charset="0"/>
               </a:rPr>
-              <a:t>The greatest gains in accuracy were gained from adding layers and neurons and including the NAME data.  Continuing to adjust the layers, neurons and binning could further increase the prediction accuracy.</a:t>
-            </a:r>
-          </a:p>
-          <a:p>
-            <a:pPr algn="l"/>
-            <a:r>
-              <a:rPr lang="en-US" i="0" dirty="0">
+              <a:t>Compiling, Training, and Evaluating the Model</a:t>
+            </a:r>
+          </a:p>
+          <a:p>
+            <a:pPr marL="742950" lvl="1" indent="-285750" algn="l">
+              <a:buFont typeface="Arial" panose="020B0604020202020204" pitchFamily="34" charset="0"/>
+              <a:buChar char="•"/>
+            </a:pPr>
+            <a:r>
+              <a:rPr lang="en-US" sz="1600" b="0" i="0" dirty="0">
                 <a:solidFill>
                   <a:srgbClr val="2B2B2B"/>
                 </a:solidFill>
                 <a:effectLst/>
                 <a:latin typeface="Roboto" panose="02000000000000000000" pitchFamily="2" charset="0"/>
               </a:rPr>
-              <a:t>The Tanh model could also be used to try to increase the accuracy since it </a:t>
-            </a:r>
-            <a:r>
-              <a:rPr lang="en-US" i="0">
+              <a:t>I did 5 optimizations to get to the target of over 75% accuracy</a:t>
+            </a:r>
+          </a:p>
+          <a:p>
+            <a:pPr marL="1200150" lvl="2" indent="-285750">
+              <a:buFont typeface="Arial" panose="020B0604020202020204" pitchFamily="34" charset="0"/>
+              <a:buChar char="•"/>
+            </a:pPr>
+            <a:r>
+              <a:rPr lang="en-US" sz="1600" b="1" i="0" dirty="0">
                 <a:solidFill>
                   <a:srgbClr val="2B2B2B"/>
                 </a:solidFill>
                 <a:effectLst/>
                 <a:latin typeface="Roboto" panose="02000000000000000000" pitchFamily="2" charset="0"/>
               </a:rPr>
-              <a:t>will normalize the data.</a:t>
-            </a:r>
-            <a:endParaRPr lang="en-US" i="0" dirty="0">
+              <a:t>Optimization 4 </a:t>
+            </a:r>
+            <a:r>
+              <a:rPr lang="en-US" sz="1600" b="0" i="0" dirty="0">
+                <a:solidFill>
+                  <a:srgbClr val="2B2B2B"/>
+                </a:solidFill>
+                <a:effectLst/>
+                <a:latin typeface="Roboto" panose="02000000000000000000" pitchFamily="2" charset="0"/>
+              </a:rPr>
+              <a:t>– created more bins</a:t>
+            </a:r>
+          </a:p>
+          <a:p>
+            <a:pPr marL="1657350" lvl="3" indent="-285750">
+              <a:buFont typeface="Arial" panose="020B0604020202020204" pitchFamily="34" charset="0"/>
+              <a:buChar char="•"/>
+            </a:pPr>
+            <a:r>
+              <a:rPr lang="en-US" sz="1600" dirty="0">
+                <a:solidFill>
+                  <a:srgbClr val="2B2B2B"/>
+                </a:solidFill>
+                <a:latin typeface="Roboto" panose="02000000000000000000" pitchFamily="2" charset="0"/>
+              </a:rPr>
+              <a:t>Dropped EIN and Name Columns</a:t>
+            </a:r>
+          </a:p>
+          <a:p>
+            <a:pPr marL="1657350" lvl="3" indent="-285750">
+              <a:buFont typeface="Arial" panose="020B0604020202020204" pitchFamily="34" charset="0"/>
+              <a:buChar char="•"/>
+            </a:pPr>
+            <a:r>
+              <a:rPr lang="en-US" sz="1600" dirty="0">
+                <a:solidFill>
+                  <a:srgbClr val="2B2B2B"/>
+                </a:solidFill>
+                <a:latin typeface="Roboto" panose="02000000000000000000" pitchFamily="2" charset="0"/>
+              </a:rPr>
+              <a:t>Changed app count cut-off from 500 to 1000</a:t>
+            </a:r>
+          </a:p>
+          <a:p>
+            <a:pPr marL="1657350" lvl="3" indent="-285750">
+              <a:buFont typeface="Arial" panose="020B0604020202020204" pitchFamily="34" charset="0"/>
+              <a:buChar char="•"/>
+            </a:pPr>
+            <a:r>
+              <a:rPr lang="en-US" sz="1600" dirty="0">
+                <a:solidFill>
+                  <a:srgbClr val="2B2B2B"/>
+                </a:solidFill>
+                <a:latin typeface="Roboto" panose="02000000000000000000" pitchFamily="2" charset="0"/>
+              </a:rPr>
+              <a:t>Changed class count cut-off from 1000 to 2000</a:t>
+            </a:r>
+          </a:p>
+          <a:p>
+            <a:pPr marL="1657350" lvl="3" indent="-285750">
+              <a:buFont typeface="Arial" panose="020B0604020202020204" pitchFamily="34" charset="0"/>
+              <a:buChar char="•"/>
+            </a:pPr>
+            <a:r>
+              <a:rPr lang="en-US" sz="1600" dirty="0">
+                <a:solidFill>
+                  <a:srgbClr val="2B2B2B"/>
+                </a:solidFill>
+                <a:latin typeface="Roboto" panose="02000000000000000000" pitchFamily="2" charset="0"/>
+              </a:rPr>
+              <a:t>1</a:t>
+            </a:r>
+            <a:r>
+              <a:rPr lang="en-US" sz="1600" baseline="30000" dirty="0">
+                <a:solidFill>
+                  <a:srgbClr val="2B2B2B"/>
+                </a:solidFill>
+                <a:latin typeface="Roboto" panose="02000000000000000000" pitchFamily="2" charset="0"/>
+              </a:rPr>
+              <a:t>st</a:t>
+            </a:r>
+            <a:r>
+              <a:rPr lang="en-US" sz="1600" dirty="0">
+                <a:solidFill>
+                  <a:srgbClr val="2B2B2B"/>
+                </a:solidFill>
+                <a:latin typeface="Roboto" panose="02000000000000000000" pitchFamily="2" charset="0"/>
+              </a:rPr>
+              <a:t> layer – 100 neurons with </a:t>
+            </a:r>
+            <a:r>
+              <a:rPr lang="en-US" sz="1600" dirty="0" err="1">
+                <a:solidFill>
+                  <a:srgbClr val="2B2B2B"/>
+                </a:solidFill>
+                <a:latin typeface="Roboto" panose="02000000000000000000" pitchFamily="2" charset="0"/>
+              </a:rPr>
+              <a:t>ReLU</a:t>
+            </a:r>
+            <a:r>
+              <a:rPr lang="en-US" sz="1600" dirty="0">
+                <a:solidFill>
+                  <a:srgbClr val="2B2B2B"/>
+                </a:solidFill>
+                <a:latin typeface="Roboto" panose="02000000000000000000" pitchFamily="2" charset="0"/>
+              </a:rPr>
+              <a:t> activation</a:t>
+            </a:r>
+          </a:p>
+          <a:p>
+            <a:pPr marL="1657350" lvl="3" indent="-285750">
+              <a:buFont typeface="Arial" panose="020B0604020202020204" pitchFamily="34" charset="0"/>
+              <a:buChar char="•"/>
+            </a:pPr>
+            <a:r>
+              <a:rPr lang="en-US" sz="1600" dirty="0">
+                <a:solidFill>
+                  <a:srgbClr val="2B2B2B"/>
+                </a:solidFill>
+                <a:latin typeface="Roboto" panose="02000000000000000000" pitchFamily="2" charset="0"/>
+              </a:rPr>
+              <a:t>2</a:t>
+            </a:r>
+            <a:r>
+              <a:rPr lang="en-US" sz="1600" baseline="30000" dirty="0">
+                <a:solidFill>
+                  <a:srgbClr val="2B2B2B"/>
+                </a:solidFill>
+                <a:latin typeface="Roboto" panose="02000000000000000000" pitchFamily="2" charset="0"/>
+              </a:rPr>
+              <a:t>nd</a:t>
+            </a:r>
+            <a:r>
+              <a:rPr lang="en-US" sz="1600" dirty="0">
+                <a:solidFill>
+                  <a:srgbClr val="2B2B2B"/>
+                </a:solidFill>
+                <a:latin typeface="Roboto" panose="02000000000000000000" pitchFamily="2" charset="0"/>
+              </a:rPr>
+              <a:t> layer – 50 neurons with </a:t>
+            </a:r>
+            <a:r>
+              <a:rPr lang="en-US" sz="1600" dirty="0" err="1">
+                <a:solidFill>
+                  <a:srgbClr val="2B2B2B"/>
+                </a:solidFill>
+                <a:latin typeface="Roboto" panose="02000000000000000000" pitchFamily="2" charset="0"/>
+              </a:rPr>
+              <a:t>ReLU</a:t>
+            </a:r>
+            <a:r>
+              <a:rPr lang="en-US" sz="1600" dirty="0">
+                <a:solidFill>
+                  <a:srgbClr val="2B2B2B"/>
+                </a:solidFill>
+                <a:latin typeface="Roboto" panose="02000000000000000000" pitchFamily="2" charset="0"/>
+              </a:rPr>
+              <a:t> activation</a:t>
+            </a:r>
+          </a:p>
+          <a:p>
+            <a:pPr marL="1657350" lvl="3" indent="-285750">
+              <a:buFont typeface="Arial" panose="020B0604020202020204" pitchFamily="34" charset="0"/>
+              <a:buChar char="•"/>
+            </a:pPr>
+            <a:r>
+              <a:rPr lang="en-US" sz="1600" dirty="0">
+                <a:solidFill>
+                  <a:srgbClr val="2B2B2B"/>
+                </a:solidFill>
+                <a:latin typeface="Roboto" panose="02000000000000000000" pitchFamily="2" charset="0"/>
+              </a:rPr>
+              <a:t>3</a:t>
+            </a:r>
+            <a:r>
+              <a:rPr lang="en-US" sz="1600" baseline="30000" dirty="0">
+                <a:solidFill>
+                  <a:srgbClr val="2B2B2B"/>
+                </a:solidFill>
+                <a:latin typeface="Roboto" panose="02000000000000000000" pitchFamily="2" charset="0"/>
+              </a:rPr>
+              <a:t>rd</a:t>
+            </a:r>
+            <a:r>
+              <a:rPr lang="en-US" sz="1600" dirty="0">
+                <a:solidFill>
+                  <a:srgbClr val="2B2B2B"/>
+                </a:solidFill>
+                <a:latin typeface="Roboto" panose="02000000000000000000" pitchFamily="2" charset="0"/>
+              </a:rPr>
+              <a:t> layer – 25 neurons with </a:t>
+            </a:r>
+            <a:r>
+              <a:rPr lang="en-US" sz="1600" dirty="0" err="1">
+                <a:solidFill>
+                  <a:srgbClr val="2B2B2B"/>
+                </a:solidFill>
+                <a:latin typeface="Roboto" panose="02000000000000000000" pitchFamily="2" charset="0"/>
+              </a:rPr>
+              <a:t>ReLU</a:t>
+            </a:r>
+            <a:r>
+              <a:rPr lang="en-US" sz="1600" dirty="0">
+                <a:solidFill>
+                  <a:srgbClr val="2B2B2B"/>
+                </a:solidFill>
+                <a:latin typeface="Roboto" panose="02000000000000000000" pitchFamily="2" charset="0"/>
+              </a:rPr>
+              <a:t> activation</a:t>
+            </a:r>
+          </a:p>
+          <a:p>
+            <a:pPr marL="1657350" lvl="3" indent="-285750">
+              <a:buFont typeface="Arial" panose="020B0604020202020204" pitchFamily="34" charset="0"/>
+              <a:buChar char="•"/>
+            </a:pPr>
+            <a:r>
+              <a:rPr lang="en-US" sz="1600" dirty="0">
+                <a:solidFill>
+                  <a:srgbClr val="2B2B2B"/>
+                </a:solidFill>
+                <a:latin typeface="Roboto" panose="02000000000000000000" pitchFamily="2" charset="0"/>
+              </a:rPr>
+              <a:t>Output layer – 1 neuron with Sigmoid activation</a:t>
+            </a:r>
+          </a:p>
+          <a:p>
+            <a:pPr marL="1657350" lvl="3" indent="-285750">
+              <a:buFont typeface="Arial" panose="020B0604020202020204" pitchFamily="34" charset="0"/>
+              <a:buChar char="•"/>
+            </a:pPr>
+            <a:r>
+              <a:rPr lang="en-US" sz="1600" dirty="0">
+                <a:solidFill>
+                  <a:srgbClr val="2B2B2B"/>
+                </a:solidFill>
+                <a:latin typeface="Roboto" panose="02000000000000000000" pitchFamily="2" charset="0"/>
+              </a:rPr>
+              <a:t>100 epochs</a:t>
+            </a:r>
+          </a:p>
+          <a:p>
+            <a:pPr marL="1657350" lvl="3" indent="-285750">
+              <a:buFont typeface="Arial" panose="020B0604020202020204" pitchFamily="34" charset="0"/>
+              <a:buChar char="•"/>
+            </a:pPr>
+            <a:r>
+              <a:rPr lang="en-US" sz="1600" dirty="0">
+                <a:solidFill>
+                  <a:srgbClr val="2B2B2B"/>
+                </a:solidFill>
+                <a:latin typeface="Roboto" panose="02000000000000000000" pitchFamily="2" charset="0"/>
+              </a:rPr>
+              <a:t>72.75% Accuracy – slightly less accuracy</a:t>
+            </a:r>
+            <a:endParaRPr lang="en-US" sz="1600" b="0" i="0" dirty="0">
               <a:solidFill>
                 <a:srgbClr val="2B2B2B"/>
               </a:solidFill>
@@ -6821,12 +7359,623 @@
               <a:latin typeface="Roboto" panose="02000000000000000000" pitchFamily="2" charset="0"/>
             </a:endParaRPr>
           </a:p>
+          <a:p>
+            <a:pPr lvl="3"/>
+            <a:endParaRPr lang="en-US" b="0" i="0" dirty="0">
+              <a:solidFill>
+                <a:srgbClr val="2B2B2B"/>
+              </a:solidFill>
+              <a:effectLst/>
+              <a:latin typeface="Roboto" panose="02000000000000000000" pitchFamily="2" charset="0"/>
+            </a:endParaRPr>
+          </a:p>
         </p:txBody>
       </p:sp>
+      <p:pic>
+        <p:nvPicPr>
+          <p:cNvPr id="8" name="Picture 7">
+            <a:extLst>
+              <a:ext uri="{FF2B5EF4-FFF2-40B4-BE49-F238E27FC236}">
+                <a16:creationId xmlns:a16="http://schemas.microsoft.com/office/drawing/2014/main" id="{71132588-1A63-123B-E1CE-BC2F40B66D73}"/>
+              </a:ext>
+            </a:extLst>
+          </p:cNvPr>
+          <p:cNvPicPr>
+            <a:picLocks noChangeAspect="1"/>
+          </p:cNvPicPr>
+          <p:nvPr/>
+        </p:nvPicPr>
+        <p:blipFill>
+          <a:blip r:embed="rId2"/>
+          <a:stretch>
+            <a:fillRect/>
+          </a:stretch>
+        </p:blipFill>
+        <p:spPr>
+          <a:xfrm>
+            <a:off x="1991612" y="4033887"/>
+            <a:ext cx="4846740" cy="2133785"/>
+          </a:xfrm>
+          <a:prstGeom prst="rect">
+            <a:avLst/>
+          </a:prstGeom>
+          <a:effectLst>
+            <a:outerShdw blurRad="63500" sx="102000" sy="102000" algn="ctr" rotWithShape="0">
+              <a:prstClr val="black">
+                <a:alpha val="40000"/>
+              </a:prstClr>
+            </a:outerShdw>
+          </a:effectLst>
+        </p:spPr>
+      </p:pic>
+      <p:pic>
+        <p:nvPicPr>
+          <p:cNvPr id="11" name="Picture 10">
+            <a:extLst>
+              <a:ext uri="{FF2B5EF4-FFF2-40B4-BE49-F238E27FC236}">
+                <a16:creationId xmlns:a16="http://schemas.microsoft.com/office/drawing/2014/main" id="{A5FEFB49-BF5A-7EB9-001C-3A55D1FC3CBD}"/>
+              </a:ext>
+            </a:extLst>
+          </p:cNvPr>
+          <p:cNvPicPr>
+            <a:picLocks noChangeAspect="1"/>
+          </p:cNvPicPr>
+          <p:nvPr/>
+        </p:nvPicPr>
+        <p:blipFill>
+          <a:blip r:embed="rId3"/>
+          <a:stretch>
+            <a:fillRect/>
+          </a:stretch>
+        </p:blipFill>
+        <p:spPr>
+          <a:xfrm>
+            <a:off x="7001164" y="1751127"/>
+            <a:ext cx="5048848" cy="4417743"/>
+          </a:xfrm>
+          <a:prstGeom prst="rect">
+            <a:avLst/>
+          </a:prstGeom>
+          <a:effectLst>
+            <a:outerShdw blurRad="63500" sx="102000" sy="102000" algn="ctr" rotWithShape="0">
+              <a:prstClr val="black">
+                <a:alpha val="40000"/>
+              </a:prstClr>
+            </a:outerShdw>
+          </a:effectLst>
+        </p:spPr>
+      </p:pic>
     </p:spTree>
     <p:extLst>
       <p:ext uri="{BB962C8B-B14F-4D97-AF65-F5344CB8AC3E}">
-        <p14:creationId xmlns:p14="http://schemas.microsoft.com/office/powerpoint/2010/main" val="4160537576"/>
+        <p14:creationId xmlns:p14="http://schemas.microsoft.com/office/powerpoint/2010/main" val="2142533285"/>
+      </p:ext>
+    </p:extLst>
+  </p:cSld>
+  <p:clrMapOvr>
+    <a:masterClrMapping/>
+  </p:clrMapOvr>
+</p:sld>
+</file>
+
+<file path=ppt/slides/slide9.xml><?xml version="1.0" encoding="utf-8"?>
+<p:sld xmlns:a="http://schemas.openxmlformats.org/drawingml/2006/main" xmlns:r="http://schemas.openxmlformats.org/officeDocument/2006/relationships" xmlns:p="http://schemas.openxmlformats.org/presentationml/2006/main">
+  <p:cSld>
+    <p:spTree>
+      <p:nvGrpSpPr>
+        <p:cNvPr id="1" name=""/>
+        <p:cNvGrpSpPr/>
+        <p:nvPr/>
+      </p:nvGrpSpPr>
+      <p:grpSpPr>
+        <a:xfrm>
+          <a:off x="0" y="0"/>
+          <a:ext cx="0" cy="0"/>
+          <a:chOff x="0" y="0"/>
+          <a:chExt cx="0" cy="0"/>
+        </a:xfrm>
+      </p:grpSpPr>
+      <p:sp>
+        <p:nvSpPr>
+          <p:cNvPr id="2" name="Title 1">
+            <a:extLst>
+              <a:ext uri="{FF2B5EF4-FFF2-40B4-BE49-F238E27FC236}">
+                <a16:creationId xmlns:a16="http://schemas.microsoft.com/office/drawing/2014/main" id="{239116D8-A839-3D25-F7BF-A9B1C7A46B65}"/>
+              </a:ext>
+            </a:extLst>
+          </p:cNvPr>
+          <p:cNvSpPr>
+            <a:spLocks noGrp="1"/>
+          </p:cNvSpPr>
+          <p:nvPr>
+            <p:ph type="title" idx="4294967295"/>
+          </p:nvPr>
+        </p:nvSpPr>
+        <p:spPr>
+          <a:xfrm>
+            <a:off x="1099133" y="69858"/>
+            <a:ext cx="10058400" cy="830262"/>
+          </a:xfrm>
+        </p:spPr>
+        <p:txBody>
+          <a:bodyPr/>
+          <a:lstStyle/>
+          <a:p>
+            <a:r>
+              <a:rPr lang="en-US" dirty="0"/>
+              <a:t>Alphabet Soup Analysis Results</a:t>
+            </a:r>
+          </a:p>
+        </p:txBody>
+      </p:sp>
+      <p:sp>
+        <p:nvSpPr>
+          <p:cNvPr id="3" name="TextBox 2">
+            <a:extLst>
+              <a:ext uri="{FF2B5EF4-FFF2-40B4-BE49-F238E27FC236}">
+                <a16:creationId xmlns:a16="http://schemas.microsoft.com/office/drawing/2014/main" id="{073306BE-897D-599C-1207-6F2819D07E18}"/>
+              </a:ext>
+            </a:extLst>
+          </p:cNvPr>
+          <p:cNvSpPr txBox="1"/>
+          <p:nvPr/>
+        </p:nvSpPr>
+        <p:spPr>
+          <a:xfrm>
+            <a:off x="526484" y="810891"/>
+            <a:ext cx="10399878" cy="3662541"/>
+          </a:xfrm>
+          <a:prstGeom prst="rect">
+            <a:avLst/>
+          </a:prstGeom>
+          <a:noFill/>
+        </p:spPr>
+        <p:txBody>
+          <a:bodyPr wrap="square" rtlCol="0">
+            <a:spAutoFit/>
+          </a:bodyPr>
+          <a:lstStyle/>
+          <a:p>
+            <a:pPr algn="l"/>
+            <a:r>
+              <a:rPr lang="en-US" b="1" i="0" dirty="0">
+                <a:solidFill>
+                  <a:srgbClr val="2B2B2B"/>
+                </a:solidFill>
+                <a:effectLst/>
+                <a:latin typeface="Roboto" panose="02000000000000000000" pitchFamily="2" charset="0"/>
+              </a:rPr>
+              <a:t>Compiling, Training, and Evaluating the Model</a:t>
+            </a:r>
+          </a:p>
+          <a:p>
+            <a:pPr marL="742950" lvl="1" indent="-285750" algn="l">
+              <a:buFont typeface="Arial" panose="020B0604020202020204" pitchFamily="34" charset="0"/>
+              <a:buChar char="•"/>
+            </a:pPr>
+            <a:r>
+              <a:rPr lang="en-US" sz="1400" dirty="0">
+                <a:solidFill>
+                  <a:srgbClr val="2B2B2B"/>
+                </a:solidFill>
+                <a:latin typeface="Roboto" panose="02000000000000000000" pitchFamily="2" charset="0"/>
+              </a:rPr>
+              <a:t>The 5</a:t>
+            </a:r>
+            <a:r>
+              <a:rPr lang="en-US" sz="1400" baseline="30000" dirty="0">
+                <a:solidFill>
+                  <a:srgbClr val="2B2B2B"/>
+                </a:solidFill>
+                <a:latin typeface="Roboto" panose="02000000000000000000" pitchFamily="2" charset="0"/>
+              </a:rPr>
+              <a:t>th</a:t>
+            </a:r>
+            <a:r>
+              <a:rPr lang="en-US" sz="1400" dirty="0">
+                <a:solidFill>
+                  <a:srgbClr val="2B2B2B"/>
+                </a:solidFill>
+                <a:latin typeface="Roboto" panose="02000000000000000000" pitchFamily="2" charset="0"/>
+              </a:rPr>
+              <a:t> Optimization was successful with almost 79% accuracy</a:t>
+            </a:r>
+          </a:p>
+          <a:p>
+            <a:pPr marL="742950" lvl="1" indent="-285750">
+              <a:buFont typeface="Arial" panose="020B0604020202020204" pitchFamily="34" charset="0"/>
+              <a:buChar char="•"/>
+            </a:pPr>
+            <a:r>
+              <a:rPr lang="en-US" sz="1400" dirty="0">
+                <a:solidFill>
+                  <a:srgbClr val="2B2B2B"/>
+                </a:solidFill>
+                <a:latin typeface="Roboto" panose="02000000000000000000" pitchFamily="2" charset="0"/>
+              </a:rPr>
+              <a:t>Adding an additional layer and increasing the neurons improved the accuracy over 20% from 51% to almost 73%.</a:t>
+            </a:r>
+          </a:p>
+          <a:p>
+            <a:pPr marL="742950" lvl="1" indent="-285750" algn="l">
+              <a:buFont typeface="Arial" panose="020B0604020202020204" pitchFamily="34" charset="0"/>
+              <a:buChar char="•"/>
+            </a:pPr>
+            <a:r>
+              <a:rPr lang="en-US" sz="1400" dirty="0">
+                <a:solidFill>
+                  <a:srgbClr val="2B2B2B"/>
+                </a:solidFill>
+                <a:latin typeface="Roboto" panose="02000000000000000000" pitchFamily="2" charset="0"/>
+              </a:rPr>
+              <a:t>Including the NAME data and binning this data improved the accuracy from almost 73% to almost 79% to reach the target of over 75% accuracy.</a:t>
+            </a:r>
+          </a:p>
+          <a:p>
+            <a:pPr marL="1200150" lvl="2" indent="-285750">
+              <a:buFont typeface="Arial" panose="020B0604020202020204" pitchFamily="34" charset="0"/>
+              <a:buChar char="•"/>
+            </a:pPr>
+            <a:r>
+              <a:rPr lang="en-US" sz="1400" b="1" dirty="0">
+                <a:solidFill>
+                  <a:srgbClr val="2B2B2B"/>
+                </a:solidFill>
+                <a:latin typeface="Roboto" panose="02000000000000000000" pitchFamily="2" charset="0"/>
+              </a:rPr>
+              <a:t>Optimization 5 </a:t>
+            </a:r>
+            <a:r>
+              <a:rPr lang="en-US" sz="1400" dirty="0">
+                <a:solidFill>
+                  <a:srgbClr val="2B2B2B"/>
+                </a:solidFill>
+                <a:latin typeface="Roboto" panose="02000000000000000000" pitchFamily="2" charset="0"/>
+              </a:rPr>
+              <a:t>– Did not drop the NAME column and binned the NAME data</a:t>
+            </a:r>
+          </a:p>
+          <a:p>
+            <a:pPr marL="1657350" lvl="3" indent="-285750">
+              <a:buFont typeface="Arial" panose="020B0604020202020204" pitchFamily="34" charset="0"/>
+              <a:buChar char="•"/>
+            </a:pPr>
+            <a:r>
+              <a:rPr lang="en-US" sz="1400" dirty="0">
+                <a:solidFill>
+                  <a:srgbClr val="2B2B2B"/>
+                </a:solidFill>
+                <a:latin typeface="Roboto" panose="02000000000000000000" pitchFamily="2" charset="0"/>
+              </a:rPr>
+              <a:t>Dropped EIN Column</a:t>
+            </a:r>
+          </a:p>
+          <a:p>
+            <a:pPr marL="1657350" lvl="3" indent="-285750">
+              <a:buFont typeface="Arial" panose="020B0604020202020204" pitchFamily="34" charset="0"/>
+              <a:buChar char="•"/>
+            </a:pPr>
+            <a:r>
+              <a:rPr lang="en-US" sz="1400" dirty="0">
+                <a:solidFill>
+                  <a:srgbClr val="2B2B2B"/>
+                </a:solidFill>
+                <a:latin typeface="Roboto" panose="02000000000000000000" pitchFamily="2" charset="0"/>
+              </a:rPr>
+              <a:t>Changed app count cut-off back to 500</a:t>
+            </a:r>
+          </a:p>
+          <a:p>
+            <a:pPr marL="1657350" lvl="3" indent="-285750">
+              <a:buFont typeface="Arial" panose="020B0604020202020204" pitchFamily="34" charset="0"/>
+              <a:buChar char="•"/>
+            </a:pPr>
+            <a:r>
+              <a:rPr lang="en-US" sz="1400" dirty="0">
+                <a:solidFill>
+                  <a:srgbClr val="2B2B2B"/>
+                </a:solidFill>
+                <a:latin typeface="Roboto" panose="02000000000000000000" pitchFamily="2" charset="0"/>
+              </a:rPr>
+              <a:t>Changed class count cut-off back to 1000</a:t>
+            </a:r>
+          </a:p>
+          <a:p>
+            <a:pPr marL="1657350" lvl="3" indent="-285750">
+              <a:buFont typeface="Arial" panose="020B0604020202020204" pitchFamily="34" charset="0"/>
+              <a:buChar char="•"/>
+            </a:pPr>
+            <a:r>
+              <a:rPr lang="en-US" sz="1400" dirty="0">
+                <a:solidFill>
+                  <a:srgbClr val="2B2B2B"/>
+                </a:solidFill>
+                <a:latin typeface="Roboto" panose="02000000000000000000" pitchFamily="2" charset="0"/>
+              </a:rPr>
+              <a:t>1</a:t>
+            </a:r>
+            <a:r>
+              <a:rPr lang="en-US" sz="1400" baseline="30000" dirty="0">
+                <a:solidFill>
+                  <a:srgbClr val="2B2B2B"/>
+                </a:solidFill>
+                <a:latin typeface="Roboto" panose="02000000000000000000" pitchFamily="2" charset="0"/>
+              </a:rPr>
+              <a:t>st</a:t>
+            </a:r>
+            <a:r>
+              <a:rPr lang="en-US" sz="1400" dirty="0">
+                <a:solidFill>
+                  <a:srgbClr val="2B2B2B"/>
+                </a:solidFill>
+                <a:latin typeface="Roboto" panose="02000000000000000000" pitchFamily="2" charset="0"/>
+              </a:rPr>
+              <a:t> layer – 100 neurons with </a:t>
+            </a:r>
+            <a:r>
+              <a:rPr lang="en-US" sz="1400" dirty="0" err="1">
+                <a:solidFill>
+                  <a:srgbClr val="2B2B2B"/>
+                </a:solidFill>
+                <a:latin typeface="Roboto" panose="02000000000000000000" pitchFamily="2" charset="0"/>
+              </a:rPr>
+              <a:t>ReLU</a:t>
+            </a:r>
+            <a:r>
+              <a:rPr lang="en-US" sz="1400" dirty="0">
+                <a:solidFill>
+                  <a:srgbClr val="2B2B2B"/>
+                </a:solidFill>
+                <a:latin typeface="Roboto" panose="02000000000000000000" pitchFamily="2" charset="0"/>
+              </a:rPr>
+              <a:t> activation</a:t>
+            </a:r>
+          </a:p>
+          <a:p>
+            <a:pPr marL="1657350" lvl="3" indent="-285750">
+              <a:buFont typeface="Arial" panose="020B0604020202020204" pitchFamily="34" charset="0"/>
+              <a:buChar char="•"/>
+            </a:pPr>
+            <a:r>
+              <a:rPr lang="en-US" sz="1400" dirty="0">
+                <a:solidFill>
+                  <a:srgbClr val="2B2B2B"/>
+                </a:solidFill>
+                <a:latin typeface="Roboto" panose="02000000000000000000" pitchFamily="2" charset="0"/>
+              </a:rPr>
+              <a:t>2</a:t>
+            </a:r>
+            <a:r>
+              <a:rPr lang="en-US" sz="1400" baseline="30000" dirty="0">
+                <a:solidFill>
+                  <a:srgbClr val="2B2B2B"/>
+                </a:solidFill>
+                <a:latin typeface="Roboto" panose="02000000000000000000" pitchFamily="2" charset="0"/>
+              </a:rPr>
+              <a:t>nd</a:t>
+            </a:r>
+            <a:r>
+              <a:rPr lang="en-US" sz="1400" dirty="0">
+                <a:solidFill>
+                  <a:srgbClr val="2B2B2B"/>
+                </a:solidFill>
+                <a:latin typeface="Roboto" panose="02000000000000000000" pitchFamily="2" charset="0"/>
+              </a:rPr>
+              <a:t> layer – 50 neurons with </a:t>
+            </a:r>
+            <a:r>
+              <a:rPr lang="en-US" sz="1400" dirty="0" err="1">
+                <a:solidFill>
+                  <a:srgbClr val="2B2B2B"/>
+                </a:solidFill>
+                <a:latin typeface="Roboto" panose="02000000000000000000" pitchFamily="2" charset="0"/>
+              </a:rPr>
+              <a:t>ReLU</a:t>
+            </a:r>
+            <a:r>
+              <a:rPr lang="en-US" sz="1400" dirty="0">
+                <a:solidFill>
+                  <a:srgbClr val="2B2B2B"/>
+                </a:solidFill>
+                <a:latin typeface="Roboto" panose="02000000000000000000" pitchFamily="2" charset="0"/>
+              </a:rPr>
+              <a:t> activation</a:t>
+            </a:r>
+          </a:p>
+          <a:p>
+            <a:pPr marL="1657350" lvl="3" indent="-285750">
+              <a:buFont typeface="Arial" panose="020B0604020202020204" pitchFamily="34" charset="0"/>
+              <a:buChar char="•"/>
+            </a:pPr>
+            <a:r>
+              <a:rPr lang="en-US" sz="1400" dirty="0">
+                <a:solidFill>
+                  <a:srgbClr val="2B2B2B"/>
+                </a:solidFill>
+                <a:latin typeface="Roboto" panose="02000000000000000000" pitchFamily="2" charset="0"/>
+              </a:rPr>
+              <a:t>3</a:t>
+            </a:r>
+            <a:r>
+              <a:rPr lang="en-US" sz="1400" baseline="30000" dirty="0">
+                <a:solidFill>
+                  <a:srgbClr val="2B2B2B"/>
+                </a:solidFill>
+                <a:latin typeface="Roboto" panose="02000000000000000000" pitchFamily="2" charset="0"/>
+              </a:rPr>
+              <a:t>rd</a:t>
+            </a:r>
+            <a:r>
+              <a:rPr lang="en-US" sz="1400" dirty="0">
+                <a:solidFill>
+                  <a:srgbClr val="2B2B2B"/>
+                </a:solidFill>
+                <a:latin typeface="Roboto" panose="02000000000000000000" pitchFamily="2" charset="0"/>
+              </a:rPr>
+              <a:t> layer – 25 neurons with </a:t>
+            </a:r>
+            <a:r>
+              <a:rPr lang="en-US" sz="1400" dirty="0" err="1">
+                <a:solidFill>
+                  <a:srgbClr val="2B2B2B"/>
+                </a:solidFill>
+                <a:latin typeface="Roboto" panose="02000000000000000000" pitchFamily="2" charset="0"/>
+              </a:rPr>
+              <a:t>ReLU</a:t>
+            </a:r>
+            <a:r>
+              <a:rPr lang="en-US" sz="1400" dirty="0">
+                <a:solidFill>
+                  <a:srgbClr val="2B2B2B"/>
+                </a:solidFill>
+                <a:latin typeface="Roboto" panose="02000000000000000000" pitchFamily="2" charset="0"/>
+              </a:rPr>
+              <a:t> activation</a:t>
+            </a:r>
+          </a:p>
+          <a:p>
+            <a:pPr marL="1657350" lvl="3" indent="-285750">
+              <a:buFont typeface="Arial" panose="020B0604020202020204" pitchFamily="34" charset="0"/>
+              <a:buChar char="•"/>
+            </a:pPr>
+            <a:r>
+              <a:rPr lang="en-US" sz="1400" dirty="0">
+                <a:solidFill>
+                  <a:srgbClr val="2B2B2B"/>
+                </a:solidFill>
+                <a:latin typeface="Roboto" panose="02000000000000000000" pitchFamily="2" charset="0"/>
+              </a:rPr>
+              <a:t>Output layer – 1 neuron with Sigmoid activation</a:t>
+            </a:r>
+          </a:p>
+          <a:p>
+            <a:pPr marL="1657350" lvl="3" indent="-285750">
+              <a:buFont typeface="Arial" panose="020B0604020202020204" pitchFamily="34" charset="0"/>
+              <a:buChar char="•"/>
+            </a:pPr>
+            <a:r>
+              <a:rPr lang="en-US" sz="1400" dirty="0">
+                <a:solidFill>
+                  <a:srgbClr val="2B2B2B"/>
+                </a:solidFill>
+                <a:latin typeface="Roboto" panose="02000000000000000000" pitchFamily="2" charset="0"/>
+              </a:rPr>
+              <a:t>100 epochs</a:t>
+            </a:r>
+          </a:p>
+          <a:p>
+            <a:pPr marL="1657350" lvl="3" indent="-285750">
+              <a:buFont typeface="Arial" panose="020B0604020202020204" pitchFamily="34" charset="0"/>
+              <a:buChar char="•"/>
+            </a:pPr>
+            <a:r>
+              <a:rPr lang="en-US" sz="1400" dirty="0">
+                <a:solidFill>
+                  <a:srgbClr val="2B2B2B"/>
+                </a:solidFill>
+                <a:latin typeface="Roboto" panose="02000000000000000000" pitchFamily="2" charset="0"/>
+              </a:rPr>
+              <a:t>78.95% Accuracy achieved to reach the target accuracy</a:t>
+            </a:r>
+            <a:endParaRPr lang="en-US" sz="1400" b="0" i="0" dirty="0">
+              <a:solidFill>
+                <a:srgbClr val="2B2B2B"/>
+              </a:solidFill>
+              <a:effectLst/>
+              <a:latin typeface="Roboto" panose="02000000000000000000" pitchFamily="2" charset="0"/>
+            </a:endParaRPr>
+          </a:p>
+          <a:p>
+            <a:pPr marL="1657350" lvl="3" indent="-285750">
+              <a:buFont typeface="Arial" panose="020B0604020202020204" pitchFamily="34" charset="0"/>
+              <a:buChar char="•"/>
+            </a:pPr>
+            <a:endParaRPr lang="en-US" b="0" i="0" dirty="0">
+              <a:solidFill>
+                <a:srgbClr val="2B2B2B"/>
+              </a:solidFill>
+              <a:effectLst/>
+              <a:latin typeface="Roboto" panose="02000000000000000000" pitchFamily="2" charset="0"/>
+            </a:endParaRPr>
+          </a:p>
+        </p:txBody>
+      </p:sp>
+      <p:pic>
+        <p:nvPicPr>
+          <p:cNvPr id="6" name="Picture 5">
+            <a:extLst>
+              <a:ext uri="{FF2B5EF4-FFF2-40B4-BE49-F238E27FC236}">
+                <a16:creationId xmlns:a16="http://schemas.microsoft.com/office/drawing/2014/main" id="{B001F94B-2701-63A1-DB8F-D87AE7A3DA67}"/>
+              </a:ext>
+            </a:extLst>
+          </p:cNvPr>
+          <p:cNvPicPr>
+            <a:picLocks noChangeAspect="1"/>
+          </p:cNvPicPr>
+          <p:nvPr/>
+        </p:nvPicPr>
+        <p:blipFill rotWithShape="1">
+          <a:blip r:embed="rId2"/>
+          <a:srcRect t="2966" b="1"/>
+          <a:stretch/>
+        </p:blipFill>
+        <p:spPr>
+          <a:xfrm>
+            <a:off x="1513722" y="4322618"/>
+            <a:ext cx="5663675" cy="1934435"/>
+          </a:xfrm>
+          <a:prstGeom prst="rect">
+            <a:avLst/>
+          </a:prstGeom>
+          <a:effectLst>
+            <a:outerShdw blurRad="63500" sx="102000" sy="102000" algn="ctr" rotWithShape="0">
+              <a:prstClr val="black">
+                <a:alpha val="40000"/>
+              </a:prstClr>
+            </a:outerShdw>
+          </a:effectLst>
+        </p:spPr>
+      </p:pic>
+      <p:pic>
+        <p:nvPicPr>
+          <p:cNvPr id="9" name="Picture 8">
+            <a:extLst>
+              <a:ext uri="{FF2B5EF4-FFF2-40B4-BE49-F238E27FC236}">
+                <a16:creationId xmlns:a16="http://schemas.microsoft.com/office/drawing/2014/main" id="{46DB64D8-F5DB-5D63-94AC-90C0400EB43B}"/>
+              </a:ext>
+            </a:extLst>
+          </p:cNvPr>
+          <p:cNvPicPr>
+            <a:picLocks noChangeAspect="1"/>
+          </p:cNvPicPr>
+          <p:nvPr/>
+        </p:nvPicPr>
+        <p:blipFill rotWithShape="1">
+          <a:blip r:embed="rId3"/>
+          <a:srcRect l="3718"/>
+          <a:stretch/>
+        </p:blipFill>
+        <p:spPr>
+          <a:xfrm>
+            <a:off x="7472218" y="2594512"/>
+            <a:ext cx="4525134" cy="3662541"/>
+          </a:xfrm>
+          <a:prstGeom prst="rect">
+            <a:avLst/>
+          </a:prstGeom>
+          <a:effectLst>
+            <a:outerShdw blurRad="63500" sx="102000" sy="102000" algn="ctr" rotWithShape="0">
+              <a:prstClr val="black">
+                <a:alpha val="40000"/>
+              </a:prstClr>
+            </a:outerShdw>
+          </a:effectLst>
+        </p:spPr>
+      </p:pic>
+    </p:spTree>
+    <p:extLst>
+      <p:ext uri="{BB962C8B-B14F-4D97-AF65-F5344CB8AC3E}">
+        <p14:creationId xmlns:p14="http://schemas.microsoft.com/office/powerpoint/2010/main" val="4058569024"/>
       </p:ext>
     </p:extLst>
   </p:cSld>

</xml_diff>

<commit_message>
M21 Alphabet Soup Challenge Report Update 3.11.24
</commit_message>
<xml_diff>
--- a/Alphabet Soup Analysis.pptx
+++ b/Alphabet Soup Analysis.pptx
@@ -134,7 +134,7 @@
   <pc:docChgLst>
     <pc:chgData name="Rae Ann Gregg" userId="45db863ef249c05a" providerId="LiveId" clId="{246A1C96-AAED-44E7-986B-F1F721A07314}"/>
     <pc:docChg chg="undo custSel addSld modSld sldOrd">
-      <pc:chgData name="Rae Ann Gregg" userId="45db863ef249c05a" providerId="LiveId" clId="{246A1C96-AAED-44E7-986B-F1F721A07314}" dt="2024-03-11T13:07:29.576" v="5129" actId="1038"/>
+      <pc:chgData name="Rae Ann Gregg" userId="45db863ef249c05a" providerId="LiveId" clId="{246A1C96-AAED-44E7-986B-F1F721A07314}" dt="2024-03-11T14:19:45.641" v="5445" actId="20577"/>
       <pc:docMkLst>
         <pc:docMk/>
       </pc:docMkLst>
@@ -421,7 +421,7 @@
         </pc:picChg>
       </pc:sldChg>
       <pc:sldChg chg="modSp add mod ord">
-        <pc:chgData name="Rae Ann Gregg" userId="45db863ef249c05a" providerId="LiveId" clId="{246A1C96-AAED-44E7-986B-F1F721A07314}" dt="2024-03-11T12:21:41.798" v="4528" actId="5793"/>
+        <pc:chgData name="Rae Ann Gregg" userId="45db863ef249c05a" providerId="LiveId" clId="{246A1C96-AAED-44E7-986B-F1F721A07314}" dt="2024-03-11T14:19:45.641" v="5445" actId="20577"/>
         <pc:sldMkLst>
           <pc:docMk/>
           <pc:sldMk cId="4160537576" sldId="262"/>
@@ -435,7 +435,7 @@
           </ac:spMkLst>
         </pc:spChg>
         <pc:spChg chg="mod">
-          <ac:chgData name="Rae Ann Gregg" userId="45db863ef249c05a" providerId="LiveId" clId="{246A1C96-AAED-44E7-986B-F1F721A07314}" dt="2024-03-11T12:21:41.798" v="4528" actId="5793"/>
+          <ac:chgData name="Rae Ann Gregg" userId="45db863ef249c05a" providerId="LiveId" clId="{246A1C96-AAED-44E7-986B-F1F721A07314}" dt="2024-03-11T14:19:45.641" v="5445" actId="20577"/>
           <ac:spMkLst>
             <pc:docMk/>
             <pc:sldMk cId="4160537576" sldId="262"/>
@@ -4436,8 +4436,8 @@
         </p:nvSpPr>
         <p:spPr>
           <a:xfrm>
-            <a:off x="1097280" y="1897811"/>
-            <a:ext cx="10134312" cy="2585323"/>
+            <a:off x="638356" y="1897811"/>
+            <a:ext cx="10964172" cy="3693319"/>
           </a:xfrm>
           <a:prstGeom prst="rect">
             <a:avLst/>
@@ -4463,6 +4463,15 @@
           </a:p>
           <a:p>
             <a:pPr algn="l"/>
+            <a:endParaRPr lang="en-US" dirty="0">
+              <a:solidFill>
+                <a:srgbClr val="2B2B2B"/>
+              </a:solidFill>
+              <a:latin typeface="Roboto" panose="02000000000000000000" pitchFamily="2" charset="0"/>
+            </a:endParaRPr>
+          </a:p>
+          <a:p>
+            <a:pPr algn="l"/>
             <a:r>
               <a:rPr lang="en-US" dirty="0">
                 <a:solidFill>
@@ -4470,11 +4479,21 @@
                 </a:solidFill>
                 <a:latin typeface="Roboto" panose="02000000000000000000" pitchFamily="2" charset="0"/>
               </a:rPr>
-              <a:t>It would be ideal to continue to try other models to improve the accuracy even more.   </a:t>
+              <a:t>We could continue to try other models to improve the accuracy even more.   </a:t>
             </a:r>
           </a:p>
           <a:p>
             <a:pPr algn="l"/>
+            <a:endParaRPr lang="en-US" i="0" dirty="0">
+              <a:solidFill>
+                <a:srgbClr val="2B2B2B"/>
+              </a:solidFill>
+              <a:effectLst/>
+              <a:latin typeface="Roboto" panose="02000000000000000000" pitchFamily="2" charset="0"/>
+            </a:endParaRPr>
+          </a:p>
+          <a:p>
+            <a:pPr algn="l"/>
             <a:r>
               <a:rPr lang="en-US" i="0" dirty="0">
                 <a:solidFill>
@@ -4483,7 +4502,7 @@
                 <a:effectLst/>
                 <a:latin typeface="Roboto" panose="02000000000000000000" pitchFamily="2" charset="0"/>
               </a:rPr>
-              <a:t>The greatest gains in accuracy were gained from adding layers and neurons and including the NAME data.  Continuing to adjust the layers, neurons and binning could further increase the prediction accuracy.</a:t>
+              <a:t>The greatest gains in accuracy were gained from adding layers and neurons and including the NAME data.  </a:t>
             </a:r>
           </a:p>
           <a:p>
@@ -4496,11 +4515,44 @@
                 <a:effectLst/>
                 <a:latin typeface="Roboto" panose="02000000000000000000" pitchFamily="2" charset="0"/>
               </a:rPr>
+              <a:t>Continuing to adjust the layers, neurons, and binning could further increase the prediction accuracy.</a:t>
+            </a:r>
+          </a:p>
+          <a:p>
+            <a:pPr algn="l"/>
+            <a:endParaRPr lang="en-US" i="0" dirty="0">
+              <a:solidFill>
+                <a:srgbClr val="2B2B2B"/>
+              </a:solidFill>
+              <a:effectLst/>
+              <a:latin typeface="Roboto" panose="02000000000000000000" pitchFamily="2" charset="0"/>
+            </a:endParaRPr>
+          </a:p>
+          <a:p>
+            <a:pPr algn="l"/>
+            <a:r>
+              <a:rPr lang="en-US" i="0" dirty="0">
+                <a:solidFill>
+                  <a:srgbClr val="2B2B2B"/>
+                </a:solidFill>
+                <a:effectLst/>
+                <a:latin typeface="Roboto" panose="02000000000000000000" pitchFamily="2" charset="0"/>
+              </a:rPr>
               <a:t>The Tanh model could also be used to try to increase the accuracy since it will normalize the data.</a:t>
             </a:r>
           </a:p>
           <a:p>
             <a:pPr algn="l"/>
+            <a:endParaRPr lang="en-US" i="0" dirty="0">
+              <a:solidFill>
+                <a:srgbClr val="2B2B2B"/>
+              </a:solidFill>
+              <a:effectLst/>
+              <a:latin typeface="Roboto" panose="02000000000000000000" pitchFamily="2" charset="0"/>
+            </a:endParaRPr>
+          </a:p>
+          <a:p>
+            <a:pPr algn="l"/>
             <a:r>
               <a:rPr lang="en-US" i="0" dirty="0">
                 <a:solidFill>
@@ -4518,7 +4570,7 @@
                 </a:solidFill>
                 <a:latin typeface="Roboto" panose="02000000000000000000" pitchFamily="2" charset="0"/>
               </a:rPr>
-              <a:t>andom Forest Model can also be used to create a decision tree to find the predictive variables. Explain why…</a:t>
+              <a:t>andom Forest Model can also be used to create a decision tree to find the predictive variables. The Random Forest Model will build multiple trees.  Each tree will be trained independently which helps to reduce overfitting.  This could also increase the accuracy of predicting successful campaigns.</a:t>
             </a:r>
             <a:endParaRPr lang="en-US" i="0" dirty="0">
               <a:solidFill>

</xml_diff>